<commit_message>
Ajust presentation for junkSort.AI
</commit_message>
<xml_diff>
--- a/junksort-presentation.pptx
+++ b/junksort-presentation.pptx
@@ -5,21 +5,17 @@
     <p:sldMasterId id="2147483648" r:id="rId2"/>
   </p:sldMasterIdLst>
   <p:notesMasterIdLst>
-    <p:notesMasterId r:id="rId12"/>
+    <p:notesMasterId r:id="rId8"/>
   </p:notesMasterIdLst>
   <p:handoutMasterIdLst>
-    <p:handoutMasterId r:id="rId13"/>
+    <p:handoutMasterId r:id="rId9"/>
   </p:handoutMasterIdLst>
   <p:sldIdLst>
     <p:sldId id="261" r:id="rId3"/>
-    <p:sldId id="269" r:id="rId4"/>
-    <p:sldId id="268" r:id="rId5"/>
-    <p:sldId id="271" r:id="rId6"/>
-    <p:sldId id="272" r:id="rId7"/>
-    <p:sldId id="293" r:id="rId8"/>
-    <p:sldId id="296" r:id="rId9"/>
-    <p:sldId id="263" r:id="rId10"/>
-    <p:sldId id="291" r:id="rId11"/>
+    <p:sldId id="272" r:id="rId4"/>
+    <p:sldId id="293" r:id="rId5"/>
+    <p:sldId id="296" r:id="rId6"/>
+    <p:sldId id="291" r:id="rId7"/>
   </p:sldIdLst>
   <p:sldSz cx="12192000" cy="6858000"/>
   <p:notesSz cx="6858000" cy="9144000"/>
@@ -140,6 +136,10 @@
 </p:presentation>
 </file>
 
+<file path=ppt/revisionInfo.xml><?xml version="1.0" encoding="utf-8"?>
+<p1510:revInfo xmlns:a="http://schemas.openxmlformats.org/drawingml/2006/main" xmlns:r="http://schemas.openxmlformats.org/officeDocument/2006/relationships" xmlns:p1510="http://schemas.microsoft.com/office/powerpoint/2015/10/main"/>
+</file>
+
 <file path=ppt/handoutMasters/handoutMaster1.xml><?xml version="1.0" encoding="utf-8"?>
 <p:handoutMaster xmlns:a="http://schemas.openxmlformats.org/drawingml/2006/main" xmlns:r="http://schemas.openxmlformats.org/officeDocument/2006/relationships" xmlns:p="http://schemas.openxmlformats.org/presentationml/2006/main">
   <p:cSld>
@@ -222,7 +222,7 @@
           <a:p>
             <a:fld id="{59041DB8-B66F-4DC8-A96E-33677E0F90FF}" type="datetimeFigureOut">
               <a:rPr lang="en-US" smtClean="0"/>
-              <a:t>6/24/2017</a:t>
+              <a:t>6/25/2017</a:t>
             </a:fld>
             <a:endParaRPr lang="en-US"/>
           </a:p>
@@ -288,7 +288,7 @@
           <a:p>
             <a:fld id="{1604A0D4-B89B-4ADD-AF9E-38636B40EE4E}" type="slidenum">
               <a:rPr lang="en-US" smtClean="0"/>
-              <a:t>‹#›</a:t>
+              <a:t>‹N°›</a:t>
             </a:fld>
             <a:endParaRPr lang="en-US"/>
           </a:p>
@@ -387,7 +387,7 @@
           <a:p>
             <a:fld id="{DEB49C4A-65AC-492D-9701-81B46C3AD0E4}" type="datetimeFigureOut">
               <a:rPr lang="en-US" smtClean="0"/>
-              <a:t>6/24/2017</a:t>
+              <a:t>6/25/2017</a:t>
             </a:fld>
             <a:endParaRPr lang="en-US"/>
           </a:p>
@@ -545,7 +545,7 @@
           <a:p>
             <a:fld id="{82869989-EB00-4EE7-BCB5-25BDC5BB29F8}" type="slidenum">
               <a:rPr lang="en-US" smtClean="0"/>
-              <a:t>‹#›</a:t>
+              <a:t>‹N°›</a:t>
             </a:fld>
             <a:endParaRPr lang="en-US"/>
           </a:p>
@@ -782,7 +782,30 @@
           <a:bodyPr/>
           <a:lstStyle/>
           <a:p>
-            <a:endParaRPr lang="en-US" dirty="0"/>
+            <a:r>
+              <a:rPr lang="en-US" dirty="0"/>
+              <a:t>For this project, I used </a:t>
+            </a:r>
+            <a:r>
+              <a:rPr lang="en-US" dirty="0" err="1"/>
+              <a:t>rfMRI</a:t>
+            </a:r>
+            <a:r>
+              <a:rPr lang="en-US" dirty="0"/>
+              <a:t> data from the Human Connectome Project, which is a collection of a large amount of MRI, behavioral data with pre-processing. More in a second.</a:t>
+            </a:r>
+          </a:p>
+          <a:p>
+            <a:r>
+              <a:rPr lang="en-US" dirty="0"/>
+              <a:t>Also used built-in functions from toolboxes such as the Signal Processing toolbox, for data smoothing and analysis.</a:t>
+            </a:r>
+          </a:p>
+          <a:p>
+            <a:r>
+              <a:rPr lang="en-US" dirty="0"/>
+              <a:t>Finally, a major component of the multi-node analysis phase of this investigation is a dimensionality reduction algorithm. </a:t>
+            </a:r>
           </a:p>
         </p:txBody>
       </p:sp>
@@ -812,7 +835,7 @@
     </p:spTree>
     <p:extLst>
       <p:ext uri="{BB962C8B-B14F-4D97-AF65-F5344CB8AC3E}">
-        <p14:creationId xmlns:p14="http://schemas.microsoft.com/office/powerpoint/2010/main" val="884752217"/>
+        <p14:creationId xmlns:p14="http://schemas.microsoft.com/office/powerpoint/2010/main" val="4285019500"/>
       </p:ext>
     </p:extLst>
   </p:cSld>
@@ -866,7 +889,10 @@
           <a:bodyPr/>
           <a:lstStyle/>
           <a:p>
-            <a:endParaRPr lang="en-US" dirty="0"/>
+            <a:r>
+              <a:rPr lang="en-US" dirty="0"/>
+              <a:t>Say the different step of training ( only paper and cardboard)</a:t>
+            </a:r>
           </a:p>
         </p:txBody>
       </p:sp>
@@ -896,7 +922,7 @@
     </p:spTree>
     <p:extLst>
       <p:ext uri="{BB962C8B-B14F-4D97-AF65-F5344CB8AC3E}">
-        <p14:creationId xmlns:p14="http://schemas.microsoft.com/office/powerpoint/2010/main" val="877704926"/>
+        <p14:creationId xmlns:p14="http://schemas.microsoft.com/office/powerpoint/2010/main" val="1673657839"/>
       </p:ext>
     </p:extLst>
   </p:cSld>
@@ -907,346 +933,6 @@
 </file>
 
 <file path=ppt/notesSlides/notesSlide4.xml><?xml version="1.0" encoding="utf-8"?>
-<p:notes xmlns:a="http://schemas.openxmlformats.org/drawingml/2006/main" xmlns:r="http://schemas.openxmlformats.org/officeDocument/2006/relationships" xmlns:p="http://schemas.openxmlformats.org/presentationml/2006/main">
-  <p:cSld>
-    <p:spTree>
-      <p:nvGrpSpPr>
-        <p:cNvPr id="1" name=""/>
-        <p:cNvGrpSpPr/>
-        <p:nvPr/>
-      </p:nvGrpSpPr>
-      <p:grpSpPr>
-        <a:xfrm>
-          <a:off x="0" y="0"/>
-          <a:ext cx="0" cy="0"/>
-          <a:chOff x="0" y="0"/>
-          <a:chExt cx="0" cy="0"/>
-        </a:xfrm>
-      </p:grpSpPr>
-      <p:sp>
-        <p:nvSpPr>
-          <p:cNvPr id="2" name="Slide Image Placeholder 1"/>
-          <p:cNvSpPr>
-            <a:spLocks noGrp="1" noRot="1" noChangeAspect="1"/>
-          </p:cNvSpPr>
-          <p:nvPr>
-            <p:ph type="sldImg"/>
-          </p:nvPr>
-        </p:nvSpPr>
-        <p:spPr/>
-      </p:sp>
-      <p:sp>
-        <p:nvSpPr>
-          <p:cNvPr id="3" name="Notes Placeholder 2"/>
-          <p:cNvSpPr>
-            <a:spLocks noGrp="1"/>
-          </p:cNvSpPr>
-          <p:nvPr>
-            <p:ph type="body" idx="1"/>
-          </p:nvPr>
-        </p:nvSpPr>
-        <p:spPr/>
-        <p:txBody>
-          <a:bodyPr/>
-          <a:lstStyle/>
-          <a:p>
-            <a:r>
-              <a:rPr lang="en-US" dirty="0"/>
-              <a:t>Similarly to how you would see me return to Leggett time after time, are there variables we can identify to characterize whether an individual is returning to the same thought? And do individual differences in natural thought behavior relate to hippocampal volumes?</a:t>
-            </a:r>
-          </a:p>
-          <a:p>
-            <a:endParaRPr lang="en-US" dirty="0"/>
-          </a:p>
-          <a:p>
-            <a:r>
-              <a:rPr lang="en-US" dirty="0"/>
-              <a:t>These questions guided the investigation goals. Of course, a difficult problem since there is no ground truth, but interesting nonetheless!</a:t>
-            </a:r>
-          </a:p>
-        </p:txBody>
-      </p:sp>
-      <p:sp>
-        <p:nvSpPr>
-          <p:cNvPr id="4" name="Slide Number Placeholder 3"/>
-          <p:cNvSpPr>
-            <a:spLocks noGrp="1"/>
-          </p:cNvSpPr>
-          <p:nvPr>
-            <p:ph type="sldNum" sz="quarter" idx="10"/>
-          </p:nvPr>
-        </p:nvSpPr>
-        <p:spPr/>
-        <p:txBody>
-          <a:bodyPr/>
-          <a:lstStyle/>
-          <a:p>
-            <a:fld id="{82869989-EB00-4EE7-BCB5-25BDC5BB29F8}" type="slidenum">
-              <a:rPr lang="en-US" smtClean="0"/>
-              <a:t>4</a:t>
-            </a:fld>
-            <a:endParaRPr lang="en-US"/>
-          </a:p>
-        </p:txBody>
-      </p:sp>
-    </p:spTree>
-    <p:extLst>
-      <p:ext uri="{BB962C8B-B14F-4D97-AF65-F5344CB8AC3E}">
-        <p14:creationId xmlns:p14="http://schemas.microsoft.com/office/powerpoint/2010/main" val="233235134"/>
-      </p:ext>
-    </p:extLst>
-  </p:cSld>
-  <p:clrMapOvr>
-    <a:masterClrMapping/>
-  </p:clrMapOvr>
-</p:notes>
-</file>
-
-<file path=ppt/notesSlides/notesSlide5.xml><?xml version="1.0" encoding="utf-8"?>
-<p:notes xmlns:a="http://schemas.openxmlformats.org/drawingml/2006/main" xmlns:r="http://schemas.openxmlformats.org/officeDocument/2006/relationships" xmlns:p="http://schemas.openxmlformats.org/presentationml/2006/main">
-  <p:cSld>
-    <p:spTree>
-      <p:nvGrpSpPr>
-        <p:cNvPr id="1" name=""/>
-        <p:cNvGrpSpPr/>
-        <p:nvPr/>
-      </p:nvGrpSpPr>
-      <p:grpSpPr>
-        <a:xfrm>
-          <a:off x="0" y="0"/>
-          <a:ext cx="0" cy="0"/>
-          <a:chOff x="0" y="0"/>
-          <a:chExt cx="0" cy="0"/>
-        </a:xfrm>
-      </p:grpSpPr>
-      <p:sp>
-        <p:nvSpPr>
-          <p:cNvPr id="2" name="Slide Image Placeholder 1"/>
-          <p:cNvSpPr>
-            <a:spLocks noGrp="1" noRot="1" noChangeAspect="1"/>
-          </p:cNvSpPr>
-          <p:nvPr>
-            <p:ph type="sldImg"/>
-          </p:nvPr>
-        </p:nvSpPr>
-        <p:spPr/>
-      </p:sp>
-      <p:sp>
-        <p:nvSpPr>
-          <p:cNvPr id="3" name="Notes Placeholder 2"/>
-          <p:cNvSpPr>
-            <a:spLocks noGrp="1"/>
-          </p:cNvSpPr>
-          <p:nvPr>
-            <p:ph type="body" idx="1"/>
-          </p:nvPr>
-        </p:nvSpPr>
-        <p:spPr/>
-        <p:txBody>
-          <a:bodyPr/>
-          <a:lstStyle/>
-          <a:p>
-            <a:r>
-              <a:rPr lang="en-US" dirty="0"/>
-              <a:t>For this project, I used </a:t>
-            </a:r>
-            <a:r>
-              <a:rPr lang="en-US" dirty="0" err="1"/>
-              <a:t>rfMRI</a:t>
-            </a:r>
-            <a:r>
-              <a:rPr lang="en-US" dirty="0"/>
-              <a:t> data from the Human Connectome Project, which is a collection of a large amount of MRI, behavioral data with pre-processing. More in a second.</a:t>
-            </a:r>
-          </a:p>
-          <a:p>
-            <a:r>
-              <a:rPr lang="en-US" dirty="0"/>
-              <a:t>Also used built-in functions from toolboxes such as the Signal Processing toolbox, for data smoothing and analysis.</a:t>
-            </a:r>
-          </a:p>
-          <a:p>
-            <a:r>
-              <a:rPr lang="en-US" dirty="0"/>
-              <a:t>Finally, a major component of the multi-node analysis phase of this investigation is a dimensionality reduction algorithm. </a:t>
-            </a:r>
-          </a:p>
-        </p:txBody>
-      </p:sp>
-      <p:sp>
-        <p:nvSpPr>
-          <p:cNvPr id="4" name="Slide Number Placeholder 3"/>
-          <p:cNvSpPr>
-            <a:spLocks noGrp="1"/>
-          </p:cNvSpPr>
-          <p:nvPr>
-            <p:ph type="sldNum" sz="quarter" idx="10"/>
-          </p:nvPr>
-        </p:nvSpPr>
-        <p:spPr/>
-        <p:txBody>
-          <a:bodyPr/>
-          <a:lstStyle/>
-          <a:p>
-            <a:fld id="{82869989-EB00-4EE7-BCB5-25BDC5BB29F8}" type="slidenum">
-              <a:rPr lang="en-US" smtClean="0"/>
-              <a:t>5</a:t>
-            </a:fld>
-            <a:endParaRPr lang="en-US"/>
-          </a:p>
-        </p:txBody>
-      </p:sp>
-    </p:spTree>
-    <p:extLst>
-      <p:ext uri="{BB962C8B-B14F-4D97-AF65-F5344CB8AC3E}">
-        <p14:creationId xmlns:p14="http://schemas.microsoft.com/office/powerpoint/2010/main" val="4285019500"/>
-      </p:ext>
-    </p:extLst>
-  </p:cSld>
-  <p:clrMapOvr>
-    <a:masterClrMapping/>
-  </p:clrMapOvr>
-</p:notes>
-</file>
-
-<file path=ppt/notesSlides/notesSlide6.xml><?xml version="1.0" encoding="utf-8"?>
-<p:notes xmlns:a="http://schemas.openxmlformats.org/drawingml/2006/main" xmlns:r="http://schemas.openxmlformats.org/officeDocument/2006/relationships" xmlns:p="http://schemas.openxmlformats.org/presentationml/2006/main">
-  <p:cSld>
-    <p:spTree>
-      <p:nvGrpSpPr>
-        <p:cNvPr id="1" name=""/>
-        <p:cNvGrpSpPr/>
-        <p:nvPr/>
-      </p:nvGrpSpPr>
-      <p:grpSpPr>
-        <a:xfrm>
-          <a:off x="0" y="0"/>
-          <a:ext cx="0" cy="0"/>
-          <a:chOff x="0" y="0"/>
-          <a:chExt cx="0" cy="0"/>
-        </a:xfrm>
-      </p:grpSpPr>
-      <p:sp>
-        <p:nvSpPr>
-          <p:cNvPr id="2" name="Slide Image Placeholder 1"/>
-          <p:cNvSpPr>
-            <a:spLocks noGrp="1" noRot="1" noChangeAspect="1"/>
-          </p:cNvSpPr>
-          <p:nvPr>
-            <p:ph type="sldImg"/>
-          </p:nvPr>
-        </p:nvSpPr>
-        <p:spPr/>
-      </p:sp>
-      <p:sp>
-        <p:nvSpPr>
-          <p:cNvPr id="3" name="Notes Placeholder 2"/>
-          <p:cNvSpPr>
-            <a:spLocks noGrp="1"/>
-          </p:cNvSpPr>
-          <p:nvPr>
-            <p:ph type="body" idx="1"/>
-          </p:nvPr>
-        </p:nvSpPr>
-        <p:spPr/>
-        <p:txBody>
-          <a:bodyPr/>
-          <a:lstStyle/>
-          <a:p>
-            <a:r>
-              <a:rPr lang="en-US" dirty="0"/>
-              <a:t>I used the resting state fMRI data from the </a:t>
-            </a:r>
-            <a:r>
-              <a:rPr lang="en-US" dirty="0" err="1"/>
-              <a:t>MegaTrawl</a:t>
-            </a:r>
-            <a:r>
-              <a:rPr lang="en-US" dirty="0"/>
-              <a:t> release, where the data was pre-processed into network matrices which are easy to work with. </a:t>
-            </a:r>
-          </a:p>
-          <a:p>
-            <a:r>
-              <a:rPr lang="en-US" dirty="0"/>
-              <a:t>There were 820 subjects in the sample, each with an hour’s worth of fMRI data. </a:t>
-            </a:r>
-          </a:p>
-          <a:p>
-            <a:r>
-              <a:rPr lang="en-US" dirty="0"/>
-              <a:t>fMRIs are a method of looking at brain activity over time. They rely on the BOLD concept, where BOLD stands for Blood oxygen level dependent contrast imaging.</a:t>
-            </a:r>
-          </a:p>
-          <a:p>
-            <a:r>
-              <a:rPr lang="en-US" dirty="0"/>
-              <a:t>Essentially, when neurons fire, there is a sharp intake of oxygen to give it the energy it needs. Furthermore, there are differences in the magnetism of oxygenated and deoxygenated blood.</a:t>
-            </a:r>
-          </a:p>
-          <a:p>
-            <a:r>
-              <a:rPr lang="en-US" dirty="0"/>
-              <a:t>By taking a control condition, the fMRI looks at these changes in magnetism and infers brain activity from that. </a:t>
-            </a:r>
-          </a:p>
-          <a:p>
-            <a:endParaRPr lang="en-US" dirty="0"/>
-          </a:p>
-          <a:p>
-            <a:r>
-              <a:rPr lang="en-US" dirty="0"/>
-              <a:t>The network matrices have 4800 timepoints sampled at 750ms – that’s an hour’s worth of data. Furthermore, the data for each individual is available in different numbers of nodes, or a group of regions of the brain. This data is provided for 15, 25, 50, 100, 200, 300 nodes – so at each time point, there are X values that collectively describe the state of the brain. We used the 15 node one in this analysis. </a:t>
-            </a:r>
-          </a:p>
-          <a:p>
-            <a:endParaRPr lang="en-US" dirty="0"/>
-          </a:p>
-          <a:p>
-            <a:r>
-              <a:rPr lang="en-US" dirty="0"/>
-              <a:t>Back to my previous analogy about the travelling path – that was an easy one because we can very easily visualize the dimensions. However, we can’t visualize 15 dimensions! So where to begin? Firstly, by looking at a single node or dimension, and then looking at the multi-node case.</a:t>
-            </a:r>
-          </a:p>
-        </p:txBody>
-      </p:sp>
-      <p:sp>
-        <p:nvSpPr>
-          <p:cNvPr id="4" name="Slide Number Placeholder 3"/>
-          <p:cNvSpPr>
-            <a:spLocks noGrp="1"/>
-          </p:cNvSpPr>
-          <p:nvPr>
-            <p:ph type="sldNum" sz="quarter" idx="10"/>
-          </p:nvPr>
-        </p:nvSpPr>
-        <p:spPr/>
-        <p:txBody>
-          <a:bodyPr/>
-          <a:lstStyle/>
-          <a:p>
-            <a:fld id="{82869989-EB00-4EE7-BCB5-25BDC5BB29F8}" type="slidenum">
-              <a:rPr lang="en-US" smtClean="0"/>
-              <a:t>6</a:t>
-            </a:fld>
-            <a:endParaRPr lang="en-US"/>
-          </a:p>
-        </p:txBody>
-      </p:sp>
-    </p:spTree>
-    <p:extLst>
-      <p:ext uri="{BB962C8B-B14F-4D97-AF65-F5344CB8AC3E}">
-        <p14:creationId xmlns:p14="http://schemas.microsoft.com/office/powerpoint/2010/main" val="1673657839"/>
-      </p:ext>
-    </p:extLst>
-  </p:cSld>
-  <p:clrMapOvr>
-    <a:masterClrMapping/>
-  </p:clrMapOvr>
-</p:notes>
-</file>
-
-<file path=ppt/notesSlides/notesSlide7.xml><?xml version="1.0" encoding="utf-8"?>
 <p:notes xmlns:a="http://schemas.openxmlformats.org/drawingml/2006/main" xmlns:r="http://schemas.openxmlformats.org/officeDocument/2006/relationships" xmlns:p="http://schemas.openxmlformats.org/presentationml/2006/main">
   <p:cSld>
     <p:spTree>
@@ -1323,7 +1009,7 @@
           <a:p>
             <a:fld id="{82869989-EB00-4EE7-BCB5-25BDC5BB29F8}" type="slidenum">
               <a:rPr lang="en-US" smtClean="0"/>
-              <a:t>7</a:t>
+              <a:t>4</a:t>
             </a:fld>
             <a:endParaRPr lang="en-US"/>
           </a:p>
@@ -1333,163 +1019,6 @@
     <p:extLst>
       <p:ext uri="{BB962C8B-B14F-4D97-AF65-F5344CB8AC3E}">
         <p14:creationId xmlns:p14="http://schemas.microsoft.com/office/powerpoint/2010/main" val="273603435"/>
-      </p:ext>
-    </p:extLst>
-  </p:cSld>
-  <p:clrMapOvr>
-    <a:masterClrMapping/>
-  </p:clrMapOvr>
-</p:notes>
-</file>
-
-<file path=ppt/notesSlides/notesSlide8.xml><?xml version="1.0" encoding="utf-8"?>
-<p:notes xmlns:a="http://schemas.openxmlformats.org/drawingml/2006/main" xmlns:r="http://schemas.openxmlformats.org/officeDocument/2006/relationships" xmlns:p="http://schemas.openxmlformats.org/presentationml/2006/main">
-  <p:cSld>
-    <p:spTree>
-      <p:nvGrpSpPr>
-        <p:cNvPr id="1" name=""/>
-        <p:cNvGrpSpPr/>
-        <p:nvPr/>
-      </p:nvGrpSpPr>
-      <p:grpSpPr>
-        <a:xfrm>
-          <a:off x="0" y="0"/>
-          <a:ext cx="0" cy="0"/>
-          <a:chOff x="0" y="0"/>
-          <a:chExt cx="0" cy="0"/>
-        </a:xfrm>
-      </p:grpSpPr>
-      <p:sp>
-        <p:nvSpPr>
-          <p:cNvPr id="2" name="Slide Image Placeholder 1"/>
-          <p:cNvSpPr>
-            <a:spLocks noGrp="1" noRot="1" noChangeAspect="1"/>
-          </p:cNvSpPr>
-          <p:nvPr>
-            <p:ph type="sldImg"/>
-          </p:nvPr>
-        </p:nvSpPr>
-        <p:spPr/>
-      </p:sp>
-      <p:sp>
-        <p:nvSpPr>
-          <p:cNvPr id="3" name="Notes Placeholder 2"/>
-          <p:cNvSpPr>
-            <a:spLocks noGrp="1"/>
-          </p:cNvSpPr>
-          <p:nvPr>
-            <p:ph type="body" idx="1"/>
-          </p:nvPr>
-        </p:nvSpPr>
-        <p:spPr/>
-        <p:txBody>
-          <a:bodyPr/>
-          <a:lstStyle/>
-          <a:p>
-            <a:r>
-              <a:rPr lang="en-US" dirty="0"/>
-              <a:t>So to recap. </a:t>
-            </a:r>
-          </a:p>
-          <a:p>
-            <a:endParaRPr lang="en-US" dirty="0"/>
-          </a:p>
-          <a:p>
-            <a:r>
-              <a:rPr lang="en-US" dirty="0"/>
-              <a:t>For each of our 820 subjects, we have their fMRI data. For each of these subjects, we smoothed their node signal and reduced the data from 15 dimensions to 2. </a:t>
-            </a:r>
-          </a:p>
-          <a:p>
-            <a:r>
-              <a:rPr lang="en-US" dirty="0"/>
-              <a:t>We applied the duration analysis I just described on thresholds varying from 5 to 50 in intervals of 5. </a:t>
-            </a:r>
-          </a:p>
-          <a:p>
-            <a:r>
-              <a:rPr lang="en-US" dirty="0"/>
-              <a:t>THEN, we arrived at three potential variables:</a:t>
-            </a:r>
-          </a:p>
-          <a:p>
-            <a:pPr marL="228600" indent="-228600">
-              <a:buAutoNum type="arabicPeriod"/>
-            </a:pPr>
-            <a:r>
-              <a:rPr lang="en-US" dirty="0"/>
-              <a:t>Maximum duration (out of all their ‘thoughts’, what was the longest one?)</a:t>
-            </a:r>
-          </a:p>
-          <a:p>
-            <a:pPr marL="228600" indent="-228600">
-              <a:buAutoNum type="arabicPeriod"/>
-            </a:pPr>
-            <a:r>
-              <a:rPr lang="en-US" dirty="0"/>
-              <a:t>Average duration (are some more prone to having longer average thoughts?)</a:t>
-            </a:r>
-          </a:p>
-          <a:p>
-            <a:pPr marL="228600" indent="-228600">
-              <a:buAutoNum type="arabicPeriod"/>
-            </a:pPr>
-            <a:r>
-              <a:rPr lang="en-US" dirty="0"/>
-              <a:t>Number of transitions (how many times did they jump from one thought to another?)</a:t>
-            </a:r>
-            <a:br>
-              <a:rPr lang="en-US" dirty="0"/>
-            </a:br>
-            <a:r>
-              <a:rPr lang="en-US" dirty="0"/>
-              <a:t>NOTE: We treated “same locations” as separation transitions and did not consider overall time spent in a certain state. Hard to classify. </a:t>
-            </a:r>
-          </a:p>
-          <a:p>
-            <a:pPr marL="228600" indent="-228600">
-              <a:buAutoNum type="arabicPeriod"/>
-            </a:pPr>
-            <a:endParaRPr lang="en-US" dirty="0"/>
-          </a:p>
-          <a:p>
-            <a:pPr marL="0" indent="0">
-              <a:buNone/>
-            </a:pPr>
-            <a:r>
-              <a:rPr lang="en-US" dirty="0"/>
-              <a:t>With these variables in mind, we want to now investigate whether there exists a correlation to hippocampus volumes. </a:t>
-            </a:r>
-          </a:p>
-        </p:txBody>
-      </p:sp>
-      <p:sp>
-        <p:nvSpPr>
-          <p:cNvPr id="4" name="Slide Number Placeholder 3"/>
-          <p:cNvSpPr>
-            <a:spLocks noGrp="1"/>
-          </p:cNvSpPr>
-          <p:nvPr>
-            <p:ph type="sldNum" sz="quarter" idx="10"/>
-          </p:nvPr>
-        </p:nvSpPr>
-        <p:spPr/>
-        <p:txBody>
-          <a:bodyPr/>
-          <a:lstStyle/>
-          <a:p>
-            <a:fld id="{82869989-EB00-4EE7-BCB5-25BDC5BB29F8}" type="slidenum">
-              <a:rPr lang="en-US" smtClean="0"/>
-              <a:t>8</a:t>
-            </a:fld>
-            <a:endParaRPr lang="en-US"/>
-          </a:p>
-        </p:txBody>
-      </p:sp>
-    </p:spTree>
-    <p:extLst>
-      <p:ext uri="{BB962C8B-B14F-4D97-AF65-F5344CB8AC3E}">
-        <p14:creationId xmlns:p14="http://schemas.microsoft.com/office/powerpoint/2010/main" val="2045883596"/>
       </p:ext>
     </p:extLst>
   </p:cSld>
@@ -3616,7 +3145,7 @@
           <a:p>
             <a:fld id="{ACFEAC65-5193-4862-9352-1BB711B6B1F9}" type="datetime1">
               <a:rPr lang="en-US" smtClean="0"/>
-              <a:t>6/24/2017</a:t>
+              <a:t>6/25/2017</a:t>
             </a:fld>
             <a:endParaRPr lang="en-US"/>
           </a:p>
@@ -3658,7 +3187,7 @@
           <a:p>
             <a:fld id="{E31375A4-56A4-47D6-9801-1991572033F7}" type="slidenum">
               <a:rPr lang="en-US" smtClean="0"/>
-              <a:t>‹#›</a:t>
+              <a:t>‹N°›</a:t>
             </a:fld>
             <a:endParaRPr lang="en-US"/>
           </a:p>
@@ -3808,7 +3337,7 @@
           <a:p>
             <a:fld id="{B9ACBB86-0596-40CF-9330-E76756A03E64}" type="datetime1">
               <a:rPr lang="en-US" smtClean="0"/>
-              <a:t>6/24/2017</a:t>
+              <a:t>6/25/2017</a:t>
             </a:fld>
             <a:endParaRPr lang="en-US"/>
           </a:p>
@@ -3850,7 +3379,7 @@
           <a:p>
             <a:fld id="{E31375A4-56A4-47D6-9801-1991572033F7}" type="slidenum">
               <a:rPr lang="en-US" smtClean="0"/>
-              <a:t>‹#›</a:t>
+              <a:t>‹N°›</a:t>
             </a:fld>
             <a:endParaRPr lang="en-US"/>
           </a:p>
@@ -3988,7 +3517,7 @@
           <a:p>
             <a:fld id="{5313A06E-9613-40CC-B4B3-B4A92F52EE92}" type="datetime1">
               <a:rPr lang="en-US" smtClean="0"/>
-              <a:t>6/24/2017</a:t>
+              <a:t>6/25/2017</a:t>
             </a:fld>
             <a:endParaRPr lang="en-US"/>
           </a:p>
@@ -4030,7 +3559,7 @@
           <a:p>
             <a:fld id="{E31375A4-56A4-47D6-9801-1991572033F7}" type="slidenum">
               <a:rPr lang="en-US" smtClean="0"/>
-              <a:t>‹#›</a:t>
+              <a:t>‹N°›</a:t>
             </a:fld>
             <a:endParaRPr lang="en-US"/>
           </a:p>
@@ -6326,7 +5855,7 @@
           <a:p>
             <a:fld id="{D556CE40-16FE-403B-842D-6203261E9313}" type="datetime1">
               <a:rPr lang="en-US" smtClean="0"/>
-              <a:t>6/24/2017</a:t>
+              <a:t>6/25/2017</a:t>
             </a:fld>
             <a:endParaRPr lang="en-US"/>
           </a:p>
@@ -6368,7 +5897,7 @@
           <a:p>
             <a:fld id="{E31375A4-56A4-47D6-9801-1991572033F7}" type="slidenum">
               <a:rPr lang="en-US" smtClean="0"/>
-              <a:t>‹#›</a:t>
+              <a:t>‹N°›</a:t>
             </a:fld>
             <a:endParaRPr lang="en-US"/>
           </a:p>
@@ -6776,7 +6305,7 @@
           <a:p>
             <a:fld id="{B60ADE00-8C06-4226-B816-0233F76FAAA5}" type="datetime1">
               <a:rPr lang="en-US" smtClean="0"/>
-              <a:t>6/24/2017</a:t>
+              <a:t>6/25/2017</a:t>
             </a:fld>
             <a:endParaRPr lang="en-US"/>
           </a:p>
@@ -6818,7 +6347,7 @@
           <a:p>
             <a:fld id="{E31375A4-56A4-47D6-9801-1991572033F7}" type="slidenum">
               <a:rPr lang="en-US" smtClean="0"/>
-              <a:t>‹#›</a:t>
+              <a:t>‹N°›</a:t>
             </a:fld>
             <a:endParaRPr lang="en-US"/>
           </a:p>
@@ -6905,7 +6434,7 @@
           <a:p>
             <a:fld id="{16194784-1CD7-4D02-A66B-9830881AF387}" type="datetime1">
               <a:rPr lang="en-US" smtClean="0"/>
-              <a:t>6/24/2017</a:t>
+              <a:t>6/25/2017</a:t>
             </a:fld>
             <a:endParaRPr lang="en-US"/>
           </a:p>
@@ -6947,7 +6476,7 @@
           <a:p>
             <a:fld id="{E31375A4-56A4-47D6-9801-1991572033F7}" type="slidenum">
               <a:rPr lang="en-US" smtClean="0"/>
-              <a:t>‹#›</a:t>
+              <a:t>‹N°›</a:t>
             </a:fld>
             <a:endParaRPr lang="en-US"/>
           </a:p>
@@ -8835,7 +8364,7 @@
           <a:p>
             <a:fld id="{03789EFE-4290-45F5-88E0-CF6DE40F1A1D}" type="datetime1">
               <a:rPr lang="en-US" smtClean="0"/>
-              <a:t>6/24/2017</a:t>
+              <a:t>6/25/2017</a:t>
             </a:fld>
             <a:endParaRPr lang="en-US"/>
           </a:p>
@@ -8878,7 +8407,7 @@
             <a:fld id="{E31375A4-56A4-47D6-9801-1991572033F7}" type="slidenum">
               <a:rPr lang="en-US" smtClean="0"/>
               <a:pPr/>
-              <a:t>‹#›</a:t>
+              <a:t>‹N°›</a:t>
             </a:fld>
             <a:endParaRPr lang="en-US"/>
           </a:p>
@@ -11082,7 +10611,7 @@
           <a:p>
             <a:fld id="{F6552604-2F42-4FE0-880A-AD7579946570}" type="datetime1">
               <a:rPr lang="en-US" smtClean="0"/>
-              <a:t>6/24/2017</a:t>
+              <a:t>6/25/2017</a:t>
             </a:fld>
             <a:endParaRPr lang="en-US"/>
           </a:p>
@@ -11125,7 +10654,7 @@
             <a:fld id="{E31375A4-56A4-47D6-9801-1991572033F7}" type="slidenum">
               <a:rPr lang="en-US" smtClean="0"/>
               <a:pPr/>
-              <a:t>‹#›</a:t>
+              <a:t>‹N°›</a:t>
             </a:fld>
             <a:endParaRPr lang="en-US"/>
           </a:p>
@@ -15309,7 +14838,7 @@
           <a:p>
             <a:fld id="{EB0B7EB0-8097-415D-99CC-44001B9BE2ED}" type="datetime1">
               <a:rPr lang="en-US" smtClean="0"/>
-              <a:t>6/24/2017</a:t>
+              <a:t>6/25/2017</a:t>
             </a:fld>
             <a:endParaRPr lang="en-US"/>
           </a:p>
@@ -15390,7 +14919,7 @@
             <a:fld id="{E31375A4-56A4-47D6-9801-1991572033F7}" type="slidenum">
               <a:rPr lang="en-US" smtClean="0"/>
               <a:pPr/>
-              <a:t>‹#›</a:t>
+              <a:t>‹N°›</a:t>
             </a:fld>
             <a:endParaRPr lang="en-US"/>
           </a:p>
@@ -15799,6 +15328,31 @@
 <file path=ppt/slides/slide1.xml><?xml version="1.0" encoding="utf-8"?>
 <p:sld xmlns:a="http://schemas.openxmlformats.org/drawingml/2006/main" xmlns:r="http://schemas.openxmlformats.org/officeDocument/2006/relationships" xmlns:p="http://schemas.openxmlformats.org/presentationml/2006/main">
   <p:cSld>
+    <p:bg>
+      <p:bgPr>
+        <a:gradFill flip="none" rotWithShape="1">
+          <a:gsLst>
+            <a:gs pos="53000">
+              <a:schemeClr val="bg1"/>
+            </a:gs>
+            <a:gs pos="0">
+              <a:schemeClr val="bg1">
+                <a:lumMod val="100000"/>
+              </a:schemeClr>
+            </a:gs>
+            <a:gs pos="100000">
+              <a:schemeClr val="bg1">
+                <a:lumMod val="95000"/>
+                <a:alpha val="65000"/>
+              </a:schemeClr>
+            </a:gs>
+          </a:gsLst>
+          <a:lin ang="5400000" scaled="1"/>
+          <a:tileRect/>
+        </a:gradFill>
+        <a:effectLst/>
+      </p:bgPr>
+    </p:bg>
     <p:spTree>
       <p:nvGrpSpPr>
         <p:cNvPr id="1" name=""/>
@@ -15823,7 +15377,15 @@
             <p:ph type="ctrTitle"/>
           </p:nvPr>
         </p:nvSpPr>
-        <p:spPr/>
+        <p:spPr>
+          <a:xfrm>
+            <a:off x="1293845" y="1653314"/>
+            <a:ext cx="9604310" cy="3383280"/>
+          </a:xfrm>
+          <a:ln>
+            <a:noFill/>
+          </a:ln>
+        </p:spPr>
         <p:txBody>
           <a:bodyPr>
             <a:normAutofit/>
@@ -15832,7 +15394,7 @@
           <a:p>
             <a:r>
               <a:rPr lang="en-US" sz="7000" dirty="0"/>
-              <a:t>junksort.AI</a:t>
+              <a:t>junkSort.AI</a:t>
             </a:r>
           </a:p>
         </p:txBody>
@@ -15852,6 +15414,9 @@
             <a:off x="1293845" y="5432563"/>
             <a:ext cx="9604310" cy="811825"/>
           </a:xfrm>
+          <a:ln>
+            <a:noFill/>
+          </a:ln>
         </p:spPr>
         <p:txBody>
           <a:bodyPr>
@@ -15860,25 +15425,49 @@
           <a:lstStyle/>
           <a:p>
             <a:r>
-              <a:rPr lang="en-US" i="1" dirty="0"/>
+              <a:rPr lang="en-US" i="1" dirty="0">
+                <a:solidFill>
+                  <a:srgbClr val="00B050"/>
+                </a:solidFill>
+              </a:rPr>
               <a:t>Juliette Lavoie, Isabella </a:t>
             </a:r>
             <a:r>
-              <a:rPr lang="en-US" i="1" dirty="0" err="1"/>
+              <a:rPr lang="en-US" i="1" dirty="0" err="1">
+                <a:solidFill>
+                  <a:srgbClr val="00B050"/>
+                </a:solidFill>
+              </a:rPr>
               <a:t>Nikolaidis</a:t>
             </a:r>
             <a:r>
-              <a:rPr lang="en-US" i="1" dirty="0"/>
+              <a:rPr lang="en-US" i="1" dirty="0">
+                <a:solidFill>
+                  <a:srgbClr val="00B050"/>
+                </a:solidFill>
+              </a:rPr>
               <a:t>, Julie Tseng</a:t>
             </a:r>
             <a:br>
-              <a:rPr lang="en-US" i="1" dirty="0"/>
+              <a:rPr lang="en-US" i="1" dirty="0">
+                <a:solidFill>
+                  <a:srgbClr val="00B050"/>
+                </a:solidFill>
+              </a:rPr>
             </a:br>
             <a:br>
-              <a:rPr lang="en-US" dirty="0"/>
+              <a:rPr lang="en-US" dirty="0">
+                <a:solidFill>
+                  <a:srgbClr val="00B050"/>
+                </a:solidFill>
+              </a:rPr>
             </a:br>
             <a:r>
-              <a:rPr lang="en-US" dirty="0"/>
+              <a:rPr lang="en-US" dirty="0">
+                <a:solidFill>
+                  <a:srgbClr val="00B050"/>
+                </a:solidFill>
+              </a:rPr>
               <a:t>AI for Social Good Summer Lab | McGill Innovation</a:t>
             </a:r>
           </a:p>
@@ -15894,11 +15483,11 @@
   <p:clrMapOvr>
     <a:masterClrMapping/>
   </p:clrMapOvr>
-  <mc:AlternateContent xmlns:mc="http://schemas.openxmlformats.org/markup-compatibility/2006" xmlns:p14="http://schemas.microsoft.com/office/powerpoint/2010/main">
-    <mc:Choice Requires="p14">
-      <p:transition p14:dur="0"/>
+  <mc:AlternateContent xmlns:mc="http://schemas.openxmlformats.org/markup-compatibility/2006">
+    <mc:Choice xmlns:p14="http://schemas.microsoft.com/office/powerpoint/2010/main" Requires="p14">
+      <p:transition p14:dur="10"/>
     </mc:Choice>
-    <mc:Fallback xmlns="">
+    <mc:Fallback>
       <p:transition/>
     </mc:Fallback>
   </mc:AlternateContent>
@@ -15908,6 +15497,14 @@
 <file path=ppt/slides/slide2.xml><?xml version="1.0" encoding="utf-8"?>
 <p:sld xmlns:a="http://schemas.openxmlformats.org/drawingml/2006/main" xmlns:r="http://schemas.openxmlformats.org/officeDocument/2006/relationships" xmlns:p="http://schemas.openxmlformats.org/presentationml/2006/main">
   <p:cSld>
+    <p:bg>
+      <p:bgPr>
+        <a:solidFill>
+          <a:srgbClr val="48B53F"/>
+        </a:solidFill>
+        <a:effectLst/>
+      </p:bgPr>
+    </p:bg>
     <p:spTree>
       <p:nvGrpSpPr>
         <p:cNvPr id="1" name=""/>
@@ -15937,10 +15534,9 @@
           <a:bodyPr/>
           <a:lstStyle/>
           <a:p>
-            <a:pPr algn="ctr"/>
             <a:r>
               <a:rPr lang="en-US" dirty="0"/>
-              <a:t>Overview</a:t>
+              <a:t>Our aim</a:t>
             </a:r>
           </a:p>
         </p:txBody>
@@ -15957,59 +15553,53 @@
         </p:nvSpPr>
         <p:spPr>
           <a:xfrm>
-            <a:off x="717034" y="1888959"/>
-            <a:ext cx="5384637" cy="3284621"/>
+            <a:off x="616349" y="2510343"/>
+            <a:ext cx="6217920" cy="2367665"/>
           </a:xfrm>
         </p:spPr>
         <p:txBody>
-          <a:bodyPr>
-            <a:normAutofit/>
-          </a:bodyPr>
+          <a:bodyPr/>
           <a:lstStyle/>
           <a:p>
             <a:r>
-              <a:rPr lang="en-US" sz="2400" dirty="0"/>
-              <a:t>Motivation</a:t>
+              <a:rPr lang="en-US" sz="3600" dirty="0"/>
+              <a:t>Use computer vision to aid the identification of compostable, recyclable, and waste materials</a:t>
             </a:r>
           </a:p>
           <a:p>
-            <a:r>
-              <a:rPr lang="en-US" sz="2400" dirty="0">
-                <a:sym typeface="Wingdings" panose="05000000000000000000" pitchFamily="2" charset="2"/>
-              </a:rPr>
-              <a:t>Problem Definition and Scope</a:t>
-            </a:r>
-            <a:endParaRPr lang="en-US" sz="2200" dirty="0">
-              <a:sym typeface="Wingdings" panose="05000000000000000000" pitchFamily="2" charset="2"/>
-            </a:endParaRPr>
+            <a:pPr lvl="1"/>
+            <a:endParaRPr lang="en-US" dirty="0"/>
           </a:p>
+        </p:txBody>
+      </p:sp>
+      <p:sp>
+        <p:nvSpPr>
+          <p:cNvPr id="4" name="Text Placeholder 3"/>
+          <p:cNvSpPr>
+            <a:spLocks noGrp="1"/>
+          </p:cNvSpPr>
+          <p:nvPr>
+            <p:ph type="body" sz="half" idx="2"/>
+          </p:nvPr>
+        </p:nvSpPr>
+        <p:spPr>
+          <a:xfrm>
+            <a:off x="7909560" y="2999232"/>
+            <a:ext cx="3657600" cy="2286000"/>
+          </a:xfrm>
+        </p:spPr>
+        <p:txBody>
+          <a:bodyPr/>
+          <a:lstStyle/>
           <a:p>
-            <a:r>
-              <a:rPr lang="en-US" sz="2400" dirty="0"/>
-              <a:t>Design Process</a:t>
-            </a:r>
-          </a:p>
-          <a:p>
-            <a:r>
-              <a:rPr lang="en-US" sz="2400" dirty="0"/>
-              <a:t>Final Product Demo</a:t>
-            </a:r>
-          </a:p>
-          <a:p>
-            <a:r>
-              <a:rPr lang="en-US" sz="2400" dirty="0">
-                <a:sym typeface="Wingdings" panose="05000000000000000000" pitchFamily="2" charset="2"/>
-              </a:rPr>
-              <a:t>Further Areas of Work</a:t>
-            </a:r>
-            <a:endParaRPr lang="en-US" sz="2400" dirty="0"/>
+            <a:endParaRPr lang="en-US" dirty="0"/>
           </a:p>
         </p:txBody>
       </p:sp>
     </p:spTree>
     <p:extLst>
       <p:ext uri="{BB962C8B-B14F-4D97-AF65-F5344CB8AC3E}">
-        <p14:creationId xmlns:p14="http://schemas.microsoft.com/office/powerpoint/2010/main" val="4101607575"/>
+        <p14:creationId xmlns:p14="http://schemas.microsoft.com/office/powerpoint/2010/main" val="422763014"/>
       </p:ext>
     </p:extLst>
   </p:cSld>
@@ -16030,6 +15620,14 @@
 <file path=ppt/slides/slide3.xml><?xml version="1.0" encoding="utf-8"?>
 <p:sld xmlns:a="http://schemas.openxmlformats.org/drawingml/2006/main" xmlns:r="http://schemas.openxmlformats.org/officeDocument/2006/relationships" xmlns:p="http://schemas.openxmlformats.org/presentationml/2006/main">
   <p:cSld>
+    <p:bg>
+      <p:bgPr>
+        <a:solidFill>
+          <a:srgbClr val="48B53F"/>
+        </a:solidFill>
+        <a:effectLst/>
+      </p:bgPr>
+    </p:bg>
     <p:spTree>
       <p:nvGrpSpPr>
         <p:cNvPr id="1" name=""/>
@@ -16046,55 +15644,187 @@
       </p:grpSpPr>
       <p:sp>
         <p:nvSpPr>
-          <p:cNvPr id="5" name="Title 1"/>
-          <p:cNvSpPr txBox="1">
-            <a:spLocks/>
+          <p:cNvPr id="2" name="Title 1"/>
+          <p:cNvSpPr>
+            <a:spLocks noGrp="1"/>
           </p:cNvSpPr>
-          <p:nvPr/>
+          <p:nvPr>
+            <p:ph type="title"/>
+          </p:nvPr>
+        </p:nvSpPr>
+        <p:spPr/>
+        <p:txBody>
+          <a:bodyPr/>
+          <a:lstStyle/>
+          <a:p>
+            <a:r>
+              <a:rPr lang="en-US" dirty="0"/>
+              <a:t>Process</a:t>
+            </a:r>
+          </a:p>
+        </p:txBody>
+      </p:sp>
+      <p:sp>
+        <p:nvSpPr>
+          <p:cNvPr id="5" name="Content Placeholder 4"/>
+          <p:cNvSpPr>
+            <a:spLocks noGrp="1"/>
+          </p:cNvSpPr>
+          <p:nvPr>
+            <p:ph idx="1"/>
+          </p:nvPr>
         </p:nvSpPr>
         <p:spPr>
           <a:xfrm>
-            <a:off x="7728711" y="221992"/>
-            <a:ext cx="2841709" cy="678889"/>
+            <a:off x="543197" y="966019"/>
+            <a:ext cx="6217920" cy="5691955"/>
+          </a:xfrm>
+        </p:spPr>
+        <p:txBody>
+          <a:bodyPr>
+            <a:normAutofit/>
+          </a:bodyPr>
+          <a:lstStyle/>
+          <a:p>
+            <a:r>
+              <a:rPr lang="en-US" sz="2800" dirty="0"/>
+              <a:t>Find pretrained model : Inception V3 network (based on 			)</a:t>
+            </a:r>
+          </a:p>
+          <a:p>
+            <a:endParaRPr lang="en-US" sz="2800" dirty="0"/>
+          </a:p>
+          <a:p>
+            <a:r>
+              <a:rPr lang="en-US" sz="2800" dirty="0"/>
+              <a:t>Defined labels that go in each classes (Recyclable, Compost, Trash)</a:t>
+            </a:r>
+          </a:p>
+          <a:p>
+            <a:endParaRPr lang="en-US" sz="2800" dirty="0"/>
+          </a:p>
+          <a:p>
+            <a:r>
+              <a:rPr lang="en-US" sz="2800" dirty="0"/>
+              <a:t>Retrained last layer for specific classes (</a:t>
+            </a:r>
+            <a:r>
+              <a:rPr lang="en-US" sz="2800" dirty="0" err="1"/>
+              <a:t>TensorFlow</a:t>
+            </a:r>
+            <a:r>
+              <a:rPr lang="en-US" sz="2800" dirty="0"/>
+              <a:t> for Poets)</a:t>
+            </a:r>
+          </a:p>
+          <a:p>
+            <a:endParaRPr lang="en-US" sz="2800" dirty="0"/>
+          </a:p>
+          <a:p>
+            <a:r>
+              <a:rPr lang="en-US" sz="2800" dirty="0"/>
+              <a:t>Develop android app prototype</a:t>
+            </a:r>
+          </a:p>
+          <a:p>
+            <a:endParaRPr lang="en-US" b="1" dirty="0"/>
+          </a:p>
+          <a:p>
+            <a:endParaRPr lang="en-US" b="1" dirty="0"/>
+          </a:p>
+          <a:p>
+            <a:endParaRPr lang="en-US" b="1" dirty="0"/>
+          </a:p>
+        </p:txBody>
+      </p:sp>
+      <p:sp>
+        <p:nvSpPr>
+          <p:cNvPr id="4" name="Text Placeholder 3"/>
+          <p:cNvSpPr>
+            <a:spLocks noGrp="1"/>
+          </p:cNvSpPr>
+          <p:nvPr>
+            <p:ph type="body" sz="half" idx="2"/>
+          </p:nvPr>
+        </p:nvSpPr>
+        <p:spPr>
+          <a:xfrm>
+            <a:off x="7909560" y="2999232"/>
+            <a:ext cx="3657600" cy="2286000"/>
+          </a:xfrm>
+        </p:spPr>
+        <p:txBody>
+          <a:bodyPr/>
+          <a:lstStyle/>
+          <a:p>
+            <a:endParaRPr lang="en-US" dirty="0"/>
+          </a:p>
+        </p:txBody>
+      </p:sp>
+      <p:pic>
+        <p:nvPicPr>
+          <p:cNvPr id="3" name="Image 2">
+            <a:extLst>
+              <a:ext uri="{FF2B5EF4-FFF2-40B4-BE49-F238E27FC236}">
+                <a16:creationId xmlns:a16="http://schemas.microsoft.com/office/drawing/2014/main" id="{997223AF-6AC4-4E58-98A7-84EFE75EFB14}"/>
+              </a:ext>
+            </a:extLst>
+          </p:cNvPr>
+          <p:cNvPicPr>
+            <a:picLocks noChangeAspect="1"/>
+          </p:cNvPicPr>
+          <p:nvPr/>
+        </p:nvPicPr>
+        <p:blipFill>
+          <a:blip r:embed="rId3"/>
+          <a:stretch>
+            <a:fillRect/>
+          </a:stretch>
+        </p:blipFill>
+        <p:spPr>
+          <a:xfrm>
+            <a:off x="5791853" y="5396102"/>
+            <a:ext cx="1261872" cy="1261872"/>
           </a:xfrm>
           <a:prstGeom prst="rect">
             <a:avLst/>
           </a:prstGeom>
         </p:spPr>
-        <p:txBody>
-          <a:bodyPr/>
-          <a:lstStyle>
-            <a:lvl1pPr algn="l" defTabSz="914400" rtl="0" eaLnBrk="1" latinLnBrk="0" hangingPunct="1">
-              <a:lnSpc>
-                <a:spcPct val="90000"/>
-              </a:lnSpc>
-              <a:spcBef>
-                <a:spcPct val="0"/>
-              </a:spcBef>
-              <a:buNone/>
-              <a:defRPr sz="3200" b="1" kern="1200">
-                <a:solidFill>
-                  <a:schemeClr val="accent1"/>
-                </a:solidFill>
-                <a:latin typeface="+mj-lt"/>
-                <a:ea typeface="+mj-ea"/>
-                <a:cs typeface="+mj-cs"/>
-              </a:defRPr>
-            </a:lvl1pPr>
-          </a:lstStyle>
-          <a:p>
-            <a:pPr algn="ctr"/>
-            <a:r>
-              <a:rPr lang="en-US" dirty="0"/>
-              <a:t>Introduction</a:t>
-            </a:r>
-          </a:p>
-        </p:txBody>
-      </p:sp>
+      </p:pic>
+      <p:pic>
+        <p:nvPicPr>
+          <p:cNvPr id="6" name="Image 5">
+            <a:extLst>
+              <a:ext uri="{FF2B5EF4-FFF2-40B4-BE49-F238E27FC236}">
+                <a16:creationId xmlns:a16="http://schemas.microsoft.com/office/drawing/2014/main" id="{E5FF635A-F9DD-4A5D-95EB-358FB98DA552}"/>
+              </a:ext>
+            </a:extLst>
+          </p:cNvPr>
+          <p:cNvPicPr>
+            <a:picLocks noChangeAspect="1"/>
+          </p:cNvPicPr>
+          <p:nvPr/>
+        </p:nvPicPr>
+        <p:blipFill>
+          <a:blip r:embed="rId4"/>
+          <a:stretch>
+            <a:fillRect/>
+          </a:stretch>
+        </p:blipFill>
+        <p:spPr>
+          <a:xfrm>
+            <a:off x="3966754" y="1383918"/>
+            <a:ext cx="2143125" cy="295275"/>
+          </a:xfrm>
+          <a:prstGeom prst="rect">
+            <a:avLst/>
+          </a:prstGeom>
+        </p:spPr>
+      </p:pic>
     </p:spTree>
     <p:extLst>
       <p:ext uri="{BB962C8B-B14F-4D97-AF65-F5344CB8AC3E}">
-        <p14:creationId xmlns:p14="http://schemas.microsoft.com/office/powerpoint/2010/main" val="1544302913"/>
+        <p14:creationId xmlns:p14="http://schemas.microsoft.com/office/powerpoint/2010/main" val="165317932"/>
       </p:ext>
     </p:extLst>
   </p:cSld>
@@ -16141,8 +15871,8 @@
         </p:nvSpPr>
         <p:spPr>
           <a:xfrm>
-            <a:off x="1647199" y="2979254"/>
-            <a:ext cx="4209393" cy="1142385"/>
+            <a:off x="639792" y="0"/>
+            <a:ext cx="9601200" cy="1142385"/>
           </a:xfrm>
         </p:spPr>
         <p:txBody>
@@ -16151,66 +15881,14 @@
           <a:p>
             <a:r>
               <a:rPr lang="en-US" dirty="0"/>
-              <a:t>Investigation Goals</a:t>
+              <a:t>DEMO</a:t>
             </a:r>
           </a:p>
         </p:txBody>
       </p:sp>
       <p:sp>
         <p:nvSpPr>
-          <p:cNvPr id="3" name="Content Placeholder 2"/>
-          <p:cNvSpPr>
-            <a:spLocks noGrp="1"/>
-          </p:cNvSpPr>
-          <p:nvPr>
-            <p:ph idx="1"/>
-          </p:nvPr>
-        </p:nvSpPr>
-        <p:spPr>
-          <a:xfrm>
-            <a:off x="630621" y="4121639"/>
-            <a:ext cx="10901855" cy="1292772"/>
-          </a:xfrm>
-          <a:prstGeom prst="roundRect">
-            <a:avLst/>
-          </a:prstGeom>
-        </p:spPr>
-        <p:style>
-          <a:lnRef idx="2">
-            <a:schemeClr val="accent1"/>
-          </a:lnRef>
-          <a:fillRef idx="1">
-            <a:schemeClr val="lt1"/>
-          </a:fillRef>
-          <a:effectRef idx="0">
-            <a:schemeClr val="accent1"/>
-          </a:effectRef>
-          <a:fontRef idx="minor">
-            <a:schemeClr val="dk1"/>
-          </a:fontRef>
-        </p:style>
-        <p:txBody>
-          <a:bodyPr anchor="ctr" anchorCtr="0">
-            <a:normAutofit/>
-          </a:bodyPr>
-          <a:lstStyle/>
-          <a:p>
-            <a:r>
-              <a:rPr lang="en-US" dirty="0"/>
-              <a:t>To determine meaningful variables that characterize the thought behavior of an individual</a:t>
-            </a:r>
-          </a:p>
-          <a:p>
-            <a:r>
-              <a:rPr lang="en-US" dirty="0"/>
-              <a:t>To investigate the existence of a correlation between the variables and hippocampal volume</a:t>
-            </a:r>
-          </a:p>
-        </p:txBody>
-      </p:sp>
-      <p:sp>
-        <p:nvSpPr>
-          <p:cNvPr id="4" name="Slide Number Placeholder 3"/>
+          <p:cNvPr id="5" name="Slide Number Placeholder 4"/>
           <p:cNvSpPr>
             <a:spLocks noGrp="1"/>
           </p:cNvSpPr>
@@ -16231,1258 +15909,6 @@
           </a:p>
         </p:txBody>
       </p:sp>
-      <p:sp>
-        <p:nvSpPr>
-          <p:cNvPr id="6" name="Title 1"/>
-          <p:cNvSpPr txBox="1">
-            <a:spLocks/>
-          </p:cNvSpPr>
-          <p:nvPr/>
-        </p:nvSpPr>
-        <p:spPr>
-          <a:xfrm>
-            <a:off x="1647199" y="-71252"/>
-            <a:ext cx="4209393" cy="1142385"/>
-          </a:xfrm>
-          <a:prstGeom prst="rect">
-            <a:avLst/>
-          </a:prstGeom>
-        </p:spPr>
-        <p:txBody>
-          <a:bodyPr vert="horz" lIns="91440" tIns="45720" rIns="91440" bIns="45720" rtlCol="0" anchor="b">
-            <a:normAutofit/>
-          </a:bodyPr>
-          <a:lstStyle>
-            <a:lvl1pPr algn="l" defTabSz="914400" rtl="0" eaLnBrk="1" latinLnBrk="0" hangingPunct="1">
-              <a:lnSpc>
-                <a:spcPct val="90000"/>
-              </a:lnSpc>
-              <a:spcBef>
-                <a:spcPct val="0"/>
-              </a:spcBef>
-              <a:buNone/>
-              <a:defRPr sz="3200" b="1" kern="1200">
-                <a:solidFill>
-                  <a:schemeClr val="accent1"/>
-                </a:solidFill>
-                <a:latin typeface="+mj-lt"/>
-                <a:ea typeface="+mj-ea"/>
-                <a:cs typeface="+mj-cs"/>
-              </a:defRPr>
-            </a:lvl1pPr>
-          </a:lstStyle>
-          <a:p>
-            <a:r>
-              <a:rPr lang="en-US" dirty="0"/>
-              <a:t>Main Questions</a:t>
-            </a:r>
-          </a:p>
-        </p:txBody>
-      </p:sp>
-      <p:sp>
-        <p:nvSpPr>
-          <p:cNvPr id="7" name="Content Placeholder 2"/>
-          <p:cNvSpPr txBox="1">
-            <a:spLocks/>
-          </p:cNvSpPr>
-          <p:nvPr/>
-        </p:nvSpPr>
-        <p:spPr>
-          <a:xfrm>
-            <a:off x="630621" y="1071133"/>
-            <a:ext cx="10901855" cy="1798590"/>
-          </a:xfrm>
-          <a:prstGeom prst="roundRect">
-            <a:avLst/>
-          </a:prstGeom>
-        </p:spPr>
-        <p:style>
-          <a:lnRef idx="2">
-            <a:schemeClr val="accent1"/>
-          </a:lnRef>
-          <a:fillRef idx="1">
-            <a:schemeClr val="lt1"/>
-          </a:fillRef>
-          <a:effectRef idx="0">
-            <a:schemeClr val="accent1"/>
-          </a:effectRef>
-          <a:fontRef idx="minor">
-            <a:schemeClr val="dk1"/>
-          </a:fontRef>
-        </p:style>
-        <p:txBody>
-          <a:bodyPr vert="horz" lIns="91440" tIns="45720" rIns="91440" bIns="45720" rtlCol="0" anchor="ctr" anchorCtr="0">
-            <a:normAutofit/>
-          </a:bodyPr>
-          <a:lstStyle>
-            <a:lvl1pPr marL="228600" indent="-228600" algn="l" defTabSz="914400" rtl="0" eaLnBrk="1" latinLnBrk="0" hangingPunct="1">
-              <a:lnSpc>
-                <a:spcPct val="90000"/>
-              </a:lnSpc>
-              <a:spcBef>
-                <a:spcPts val="1800"/>
-              </a:spcBef>
-              <a:buClr>
-                <a:schemeClr val="accent1"/>
-              </a:buClr>
-              <a:buSzPct val="100000"/>
-              <a:buFont typeface="Arial" pitchFamily="34" charset="0"/>
-              <a:buChar char="▪"/>
-              <a:defRPr sz="2000" kern="1200">
-                <a:solidFill>
-                  <a:schemeClr val="dk1"/>
-                </a:solidFill>
-                <a:latin typeface="+mn-lt"/>
-                <a:ea typeface="+mn-ea"/>
-                <a:cs typeface="+mn-cs"/>
-              </a:defRPr>
-            </a:lvl1pPr>
-            <a:lvl2pPr marL="457200" indent="-182880" algn="l" defTabSz="914400" rtl="0" eaLnBrk="1" latinLnBrk="0" hangingPunct="1">
-              <a:lnSpc>
-                <a:spcPct val="90000"/>
-              </a:lnSpc>
-              <a:spcBef>
-                <a:spcPts val="1200"/>
-              </a:spcBef>
-              <a:buClr>
-                <a:schemeClr val="accent1"/>
-              </a:buClr>
-              <a:buSzPct val="100000"/>
-              <a:buFont typeface="Arial" pitchFamily="34" charset="0"/>
-              <a:buChar char="▪"/>
-              <a:defRPr sz="1800" kern="1200">
-                <a:solidFill>
-                  <a:schemeClr val="dk1"/>
-                </a:solidFill>
-                <a:latin typeface="+mn-lt"/>
-                <a:ea typeface="+mn-ea"/>
-                <a:cs typeface="+mn-cs"/>
-              </a:defRPr>
-            </a:lvl2pPr>
-            <a:lvl3pPr marL="685800" indent="-179388" algn="l" defTabSz="914400" rtl="0" eaLnBrk="1" latinLnBrk="0" hangingPunct="1">
-              <a:lnSpc>
-                <a:spcPct val="90000"/>
-              </a:lnSpc>
-              <a:spcBef>
-                <a:spcPts val="800"/>
-              </a:spcBef>
-              <a:buClr>
-                <a:schemeClr val="accent1"/>
-              </a:buClr>
-              <a:buSzPct val="100000"/>
-              <a:buFont typeface="Arial" pitchFamily="34" charset="0"/>
-              <a:buChar char="▪"/>
-              <a:defRPr sz="1600" kern="1200">
-                <a:solidFill>
-                  <a:schemeClr val="dk1"/>
-                </a:solidFill>
-                <a:latin typeface="+mn-lt"/>
-                <a:ea typeface="+mn-ea"/>
-                <a:cs typeface="+mn-cs"/>
-              </a:defRPr>
-            </a:lvl3pPr>
-            <a:lvl4pPr marL="914400" indent="-182880" algn="l" defTabSz="914400" rtl="0" eaLnBrk="1" latinLnBrk="0" hangingPunct="1">
-              <a:lnSpc>
-                <a:spcPct val="90000"/>
-              </a:lnSpc>
-              <a:spcBef>
-                <a:spcPts val="800"/>
-              </a:spcBef>
-              <a:buClr>
-                <a:schemeClr val="accent1"/>
-              </a:buClr>
-              <a:buSzPct val="100000"/>
-              <a:buFont typeface="Arial" pitchFamily="34" charset="0"/>
-              <a:buChar char="▪"/>
-              <a:defRPr sz="1400" kern="1200">
-                <a:solidFill>
-                  <a:schemeClr val="dk1"/>
-                </a:solidFill>
-                <a:latin typeface="+mn-lt"/>
-                <a:ea typeface="+mn-ea"/>
-                <a:cs typeface="+mn-cs"/>
-              </a:defRPr>
-            </a:lvl4pPr>
-            <a:lvl5pPr marL="1143000" indent="-179388" algn="l" defTabSz="914400" rtl="0" eaLnBrk="1" latinLnBrk="0" hangingPunct="1">
-              <a:lnSpc>
-                <a:spcPct val="90000"/>
-              </a:lnSpc>
-              <a:spcBef>
-                <a:spcPts val="600"/>
-              </a:spcBef>
-              <a:buClr>
-                <a:schemeClr val="accent1"/>
-              </a:buClr>
-              <a:buSzPct val="100000"/>
-              <a:buFont typeface="Arial" pitchFamily="34" charset="0"/>
-              <a:buChar char="▪"/>
-              <a:defRPr sz="1400" kern="1200">
-                <a:solidFill>
-                  <a:schemeClr val="dk1"/>
-                </a:solidFill>
-                <a:latin typeface="+mn-lt"/>
-                <a:ea typeface="+mn-ea"/>
-                <a:cs typeface="+mn-cs"/>
-              </a:defRPr>
-            </a:lvl5pPr>
-            <a:lvl6pPr marL="1371600" indent="-182880" algn="l" defTabSz="914400" rtl="0" eaLnBrk="1" latinLnBrk="0" hangingPunct="1">
-              <a:lnSpc>
-                <a:spcPct val="90000"/>
-              </a:lnSpc>
-              <a:spcBef>
-                <a:spcPts val="600"/>
-              </a:spcBef>
-              <a:buClr>
-                <a:schemeClr val="accent1"/>
-              </a:buClr>
-              <a:buSzPct val="100000"/>
-              <a:buFont typeface="Arial" pitchFamily="34" charset="0"/>
-              <a:buChar char="▪"/>
-              <a:defRPr sz="1400" kern="1200">
-                <a:solidFill>
-                  <a:schemeClr val="dk1"/>
-                </a:solidFill>
-                <a:latin typeface="+mn-lt"/>
-                <a:ea typeface="+mn-ea"/>
-                <a:cs typeface="+mn-cs"/>
-              </a:defRPr>
-            </a:lvl6pPr>
-            <a:lvl7pPr marL="1600200" indent="-179388" algn="l" defTabSz="914400" rtl="0" eaLnBrk="1" latinLnBrk="0" hangingPunct="1">
-              <a:lnSpc>
-                <a:spcPct val="90000"/>
-              </a:lnSpc>
-              <a:spcBef>
-                <a:spcPts val="600"/>
-              </a:spcBef>
-              <a:buClr>
-                <a:schemeClr val="accent1"/>
-              </a:buClr>
-              <a:buSzPct val="100000"/>
-              <a:buFont typeface="Arial" pitchFamily="34" charset="0"/>
-              <a:buChar char="▪"/>
-              <a:defRPr sz="1400" kern="1200">
-                <a:solidFill>
-                  <a:schemeClr val="dk1"/>
-                </a:solidFill>
-                <a:latin typeface="+mn-lt"/>
-                <a:ea typeface="+mn-ea"/>
-                <a:cs typeface="+mn-cs"/>
-              </a:defRPr>
-            </a:lvl7pPr>
-            <a:lvl8pPr marL="1828800" indent="-182880" algn="l" defTabSz="914400" rtl="0" eaLnBrk="1" latinLnBrk="0" hangingPunct="1">
-              <a:lnSpc>
-                <a:spcPct val="90000"/>
-              </a:lnSpc>
-              <a:spcBef>
-                <a:spcPts val="600"/>
-              </a:spcBef>
-              <a:buClr>
-                <a:schemeClr val="accent1"/>
-              </a:buClr>
-              <a:buSzPct val="100000"/>
-              <a:buFont typeface="Arial" pitchFamily="34" charset="0"/>
-              <a:buChar char="▪"/>
-              <a:defRPr sz="1400" kern="1200">
-                <a:solidFill>
-                  <a:schemeClr val="dk1"/>
-                </a:solidFill>
-                <a:latin typeface="+mn-lt"/>
-                <a:ea typeface="+mn-ea"/>
-                <a:cs typeface="+mn-cs"/>
-              </a:defRPr>
-            </a:lvl8pPr>
-            <a:lvl9pPr marL="2057400" indent="-179388" algn="l" defTabSz="914400" rtl="0" eaLnBrk="1" latinLnBrk="0" hangingPunct="1">
-              <a:lnSpc>
-                <a:spcPct val="90000"/>
-              </a:lnSpc>
-              <a:spcBef>
-                <a:spcPts val="600"/>
-              </a:spcBef>
-              <a:buClr>
-                <a:schemeClr val="accent1"/>
-              </a:buClr>
-              <a:buSzPct val="100000"/>
-              <a:buFont typeface="Arial" pitchFamily="34" charset="0"/>
-              <a:buChar char="▪"/>
-              <a:defRPr sz="1400" kern="1200">
-                <a:solidFill>
-                  <a:schemeClr val="dk1"/>
-                </a:solidFill>
-                <a:latin typeface="+mn-lt"/>
-                <a:ea typeface="+mn-ea"/>
-                <a:cs typeface="+mn-cs"/>
-              </a:defRPr>
-            </a:lvl9pPr>
-          </a:lstStyle>
-          <a:p>
-            <a:r>
-              <a:rPr lang="en-US" dirty="0"/>
-              <a:t>Is the thought behavior of an individual similar to the travelling path idea?</a:t>
-            </a:r>
-          </a:p>
-          <a:p>
-            <a:pPr lvl="1"/>
-            <a:r>
-              <a:rPr lang="en-US" dirty="0"/>
-              <a:t>How do we characterize this behavior from measurable quantities? </a:t>
-            </a:r>
-          </a:p>
-          <a:p>
-            <a:r>
-              <a:rPr lang="en-US" dirty="0"/>
-              <a:t>Do individual differences in thought behavior relate to hippocampal volumes?</a:t>
-            </a:r>
-          </a:p>
-        </p:txBody>
-      </p:sp>
-    </p:spTree>
-    <p:extLst>
-      <p:ext uri="{BB962C8B-B14F-4D97-AF65-F5344CB8AC3E}">
-        <p14:creationId xmlns:p14="http://schemas.microsoft.com/office/powerpoint/2010/main" val="4159328322"/>
-      </p:ext>
-    </p:extLst>
-  </p:cSld>
-  <p:clrMapOvr>
-    <a:masterClrMapping/>
-  </p:clrMapOvr>
-  <mc:AlternateContent xmlns:mc="http://schemas.openxmlformats.org/markup-compatibility/2006" xmlns:p14="http://schemas.microsoft.com/office/powerpoint/2010/main">
-    <mc:Choice Requires="p14">
-      <p:transition p14:dur="0"/>
-    </mc:Choice>
-    <mc:Fallback xmlns="">
-      <p:transition/>
-    </mc:Fallback>
-  </mc:AlternateContent>
-</p:sld>
-</file>
-
-<file path=ppt/slides/slide5.xml><?xml version="1.0" encoding="utf-8"?>
-<p:sld xmlns:a="http://schemas.openxmlformats.org/drawingml/2006/main" xmlns:r="http://schemas.openxmlformats.org/officeDocument/2006/relationships" xmlns:p="http://schemas.openxmlformats.org/presentationml/2006/main">
-  <p:cSld>
-    <p:spTree>
-      <p:nvGrpSpPr>
-        <p:cNvPr id="1" name=""/>
-        <p:cNvGrpSpPr/>
-        <p:nvPr/>
-      </p:nvGrpSpPr>
-      <p:grpSpPr>
-        <a:xfrm>
-          <a:off x="0" y="0"/>
-          <a:ext cx="0" cy="0"/>
-          <a:chOff x="0" y="0"/>
-          <a:chExt cx="0" cy="0"/>
-        </a:xfrm>
-      </p:grpSpPr>
-      <p:sp>
-        <p:nvSpPr>
-          <p:cNvPr id="2" name="Title 1"/>
-          <p:cNvSpPr>
-            <a:spLocks noGrp="1"/>
-          </p:cNvSpPr>
-          <p:nvPr>
-            <p:ph type="title"/>
-          </p:nvPr>
-        </p:nvSpPr>
-        <p:spPr/>
-        <p:txBody>
-          <a:bodyPr/>
-          <a:lstStyle/>
-          <a:p>
-            <a:r>
-              <a:rPr lang="en-US" dirty="0"/>
-              <a:t>Background</a:t>
-            </a:r>
-          </a:p>
-        </p:txBody>
-      </p:sp>
-      <p:sp>
-        <p:nvSpPr>
-          <p:cNvPr id="5" name="Content Placeholder 4"/>
-          <p:cNvSpPr>
-            <a:spLocks noGrp="1"/>
-          </p:cNvSpPr>
-          <p:nvPr>
-            <p:ph idx="1"/>
-          </p:nvPr>
-        </p:nvSpPr>
-        <p:spPr>
-          <a:xfrm>
-            <a:off x="543197" y="796159"/>
-            <a:ext cx="6217920" cy="5861815"/>
-          </a:xfrm>
-        </p:spPr>
-        <p:txBody>
-          <a:bodyPr/>
-          <a:lstStyle/>
-          <a:p>
-            <a:r>
-              <a:rPr lang="en-US" dirty="0"/>
-              <a:t>Human Connectome Project</a:t>
-            </a:r>
-          </a:p>
-          <a:p>
-            <a:pPr lvl="1"/>
-            <a:r>
-              <a:rPr lang="en-US" dirty="0"/>
-              <a:t>Collection of a large amount of MRI and behavioral data with valuable pre-processing (ex. Group ICA)</a:t>
-            </a:r>
-          </a:p>
-          <a:p>
-            <a:pPr lvl="1"/>
-            <a:r>
-              <a:rPr lang="en-US" dirty="0"/>
-              <a:t>More on next slide</a:t>
-            </a:r>
-          </a:p>
-          <a:p>
-            <a:r>
-              <a:rPr lang="en-US" dirty="0"/>
-              <a:t>Other MATLAB Toolboxes</a:t>
-            </a:r>
-          </a:p>
-          <a:p>
-            <a:pPr lvl="1"/>
-            <a:r>
-              <a:rPr lang="en-US" dirty="0"/>
-              <a:t>Built-in functions such as:</a:t>
-            </a:r>
-          </a:p>
-          <a:p>
-            <a:pPr lvl="2"/>
-            <a:r>
-              <a:rPr lang="en-US" dirty="0"/>
-              <a:t>Smoothing average filter</a:t>
-            </a:r>
-          </a:p>
-          <a:p>
-            <a:pPr lvl="2"/>
-            <a:r>
-              <a:rPr lang="en-US" dirty="0"/>
-              <a:t>Finding abrupt changes in standard deviation</a:t>
-            </a:r>
-          </a:p>
-          <a:p>
-            <a:pPr lvl="2"/>
-            <a:r>
-              <a:rPr lang="en-US" dirty="0"/>
-              <a:t>Merging tables based on subject keys</a:t>
-            </a:r>
-          </a:p>
-          <a:p>
-            <a:pPr lvl="2"/>
-            <a:r>
-              <a:rPr lang="en-US" dirty="0"/>
-              <a:t>… and more!</a:t>
-            </a:r>
-          </a:p>
-          <a:p>
-            <a:r>
-              <a:rPr lang="en-US" dirty="0"/>
-              <a:t>t-SNE dimensionality reduction algorithm</a:t>
-            </a:r>
-          </a:p>
-          <a:p>
-            <a:pPr lvl="1"/>
-            <a:r>
-              <a:rPr lang="en-US" dirty="0"/>
-              <a:t>Major component of the multi-node analysis</a:t>
-            </a:r>
-          </a:p>
-          <a:p>
-            <a:pPr lvl="1"/>
-            <a:r>
-              <a:rPr lang="en-US" dirty="0"/>
-              <a:t>Visualizing high dimensional data</a:t>
-            </a:r>
-          </a:p>
-        </p:txBody>
-      </p:sp>
-      <p:sp>
-        <p:nvSpPr>
-          <p:cNvPr id="4" name="Text Placeholder 3"/>
-          <p:cNvSpPr>
-            <a:spLocks noGrp="1"/>
-          </p:cNvSpPr>
-          <p:nvPr>
-            <p:ph type="body" sz="half" idx="2"/>
-          </p:nvPr>
-        </p:nvSpPr>
-        <p:spPr>
-          <a:xfrm>
-            <a:off x="7909560" y="2999232"/>
-            <a:ext cx="3657600" cy="2286000"/>
-          </a:xfrm>
-        </p:spPr>
-        <p:txBody>
-          <a:bodyPr/>
-          <a:lstStyle/>
-          <a:p>
-            <a:r>
-              <a:rPr lang="en-US" dirty="0"/>
-              <a:t>Resources Used</a:t>
-            </a:r>
-          </a:p>
-        </p:txBody>
-      </p:sp>
-    </p:spTree>
-    <p:extLst>
-      <p:ext uri="{BB962C8B-B14F-4D97-AF65-F5344CB8AC3E}">
-        <p14:creationId xmlns:p14="http://schemas.microsoft.com/office/powerpoint/2010/main" val="422763014"/>
-      </p:ext>
-    </p:extLst>
-  </p:cSld>
-  <p:clrMapOvr>
-    <a:masterClrMapping/>
-  </p:clrMapOvr>
-  <mc:AlternateContent xmlns:mc="http://schemas.openxmlformats.org/markup-compatibility/2006" xmlns:p14="http://schemas.microsoft.com/office/powerpoint/2010/main">
-    <mc:Choice Requires="p14">
-      <p:transition p14:dur="0"/>
-    </mc:Choice>
-    <mc:Fallback xmlns="">
-      <p:transition/>
-    </mc:Fallback>
-  </mc:AlternateContent>
-</p:sld>
-</file>
-
-<file path=ppt/slides/slide6.xml><?xml version="1.0" encoding="utf-8"?>
-<p:sld xmlns:a="http://schemas.openxmlformats.org/drawingml/2006/main" xmlns:r="http://schemas.openxmlformats.org/officeDocument/2006/relationships" xmlns:p="http://schemas.openxmlformats.org/presentationml/2006/main">
-  <p:cSld>
-    <p:spTree>
-      <p:nvGrpSpPr>
-        <p:cNvPr id="1" name=""/>
-        <p:cNvGrpSpPr/>
-        <p:nvPr/>
-      </p:nvGrpSpPr>
-      <p:grpSpPr>
-        <a:xfrm>
-          <a:off x="0" y="0"/>
-          <a:ext cx="0" cy="0"/>
-          <a:chOff x="0" y="0"/>
-          <a:chExt cx="0" cy="0"/>
-        </a:xfrm>
-      </p:grpSpPr>
-      <p:sp>
-        <p:nvSpPr>
-          <p:cNvPr id="2" name="Title 1"/>
-          <p:cNvSpPr>
-            <a:spLocks noGrp="1"/>
-          </p:cNvSpPr>
-          <p:nvPr>
-            <p:ph type="title"/>
-          </p:nvPr>
-        </p:nvSpPr>
-        <p:spPr/>
-        <p:txBody>
-          <a:bodyPr/>
-          <a:lstStyle/>
-          <a:p>
-            <a:r>
-              <a:rPr lang="en-US" dirty="0"/>
-              <a:t>Background</a:t>
-            </a:r>
-          </a:p>
-        </p:txBody>
-      </p:sp>
-      <p:sp>
-        <p:nvSpPr>
-          <p:cNvPr id="5" name="Content Placeholder 4"/>
-          <p:cNvSpPr>
-            <a:spLocks noGrp="1"/>
-          </p:cNvSpPr>
-          <p:nvPr>
-            <p:ph idx="1"/>
-          </p:nvPr>
-        </p:nvSpPr>
-        <p:spPr>
-          <a:xfrm>
-            <a:off x="543197" y="966019"/>
-            <a:ext cx="6217920" cy="5691955"/>
-          </a:xfrm>
-        </p:spPr>
-        <p:txBody>
-          <a:bodyPr/>
-          <a:lstStyle/>
-          <a:p>
-            <a:r>
-              <a:rPr lang="en-US" dirty="0"/>
-              <a:t>HCP820-MegaTrawl Release</a:t>
-            </a:r>
-          </a:p>
-          <a:p>
-            <a:pPr lvl="1"/>
-            <a:r>
-              <a:rPr lang="en-US" dirty="0" err="1"/>
-              <a:t>rfMRI</a:t>
-            </a:r>
-            <a:r>
-              <a:rPr lang="en-US" dirty="0"/>
-              <a:t> data for 820 individuals</a:t>
-            </a:r>
-          </a:p>
-          <a:p>
-            <a:pPr lvl="2"/>
-            <a:r>
-              <a:rPr lang="en-US" dirty="0"/>
-              <a:t>Resting-state functional magnetic resonance imaging</a:t>
-            </a:r>
-          </a:p>
-          <a:p>
-            <a:pPr lvl="1"/>
-            <a:r>
-              <a:rPr lang="en-US" dirty="0"/>
-              <a:t>Data collection relies on BOLD contrast concept (Seiji):</a:t>
-            </a:r>
-          </a:p>
-          <a:p>
-            <a:pPr lvl="2"/>
-            <a:r>
-              <a:rPr lang="en-US" dirty="0"/>
-              <a:t>“Blood-oxygen-level dependent contrast imaging”</a:t>
-            </a:r>
-          </a:p>
-          <a:p>
-            <a:pPr lvl="2"/>
-            <a:r>
-              <a:rPr lang="en-US" dirty="0"/>
-              <a:t>Observes brain activity over time</a:t>
-            </a:r>
-          </a:p>
-          <a:p>
-            <a:pPr lvl="2"/>
-            <a:r>
-              <a:rPr lang="en-US" dirty="0"/>
-              <a:t>Use magnetic characteristic of oxygenated and deoxygenated blood</a:t>
-            </a:r>
-          </a:p>
-          <a:p>
-            <a:pPr lvl="1"/>
-            <a:r>
-              <a:rPr lang="en-US" dirty="0"/>
-              <a:t>Data available in </a:t>
-            </a:r>
-            <a:r>
-              <a:rPr lang="en-US" b="1" u="sng" dirty="0"/>
-              <a:t>15</a:t>
-            </a:r>
-            <a:r>
-              <a:rPr lang="en-US" dirty="0"/>
-              <a:t>, 25, 50, 100, 200, 300 nodes</a:t>
-            </a:r>
-          </a:p>
-          <a:p>
-            <a:pPr lvl="2"/>
-            <a:r>
-              <a:rPr lang="en-US" dirty="0"/>
-              <a:t>Node = group of regions of the brain</a:t>
-            </a:r>
-          </a:p>
-          <a:p>
-            <a:pPr lvl="2"/>
-            <a:r>
-              <a:rPr lang="en-US" dirty="0"/>
-              <a:t>Pre-processed with group ICA (independent components analysis)</a:t>
-            </a:r>
-          </a:p>
-          <a:p>
-            <a:r>
-              <a:rPr lang="en-US" b="1" dirty="0"/>
-              <a:t>Look at single node case and multi-node case</a:t>
-            </a:r>
-          </a:p>
-        </p:txBody>
-      </p:sp>
-      <p:sp>
-        <p:nvSpPr>
-          <p:cNvPr id="4" name="Text Placeholder 3"/>
-          <p:cNvSpPr>
-            <a:spLocks noGrp="1"/>
-          </p:cNvSpPr>
-          <p:nvPr>
-            <p:ph type="body" sz="half" idx="2"/>
-          </p:nvPr>
-        </p:nvSpPr>
-        <p:spPr>
-          <a:xfrm>
-            <a:off x="7909560" y="2999232"/>
-            <a:ext cx="3657600" cy="2286000"/>
-          </a:xfrm>
-        </p:spPr>
-        <p:txBody>
-          <a:bodyPr/>
-          <a:lstStyle/>
-          <a:p>
-            <a:r>
-              <a:rPr lang="en-US" dirty="0"/>
-              <a:t>Human Connectome Project	</a:t>
-            </a:r>
-          </a:p>
-        </p:txBody>
-      </p:sp>
-    </p:spTree>
-    <p:extLst>
-      <p:ext uri="{BB962C8B-B14F-4D97-AF65-F5344CB8AC3E}">
-        <p14:creationId xmlns:p14="http://schemas.microsoft.com/office/powerpoint/2010/main" val="165317932"/>
-      </p:ext>
-    </p:extLst>
-  </p:cSld>
-  <p:clrMapOvr>
-    <a:masterClrMapping/>
-  </p:clrMapOvr>
-  <mc:AlternateContent xmlns:mc="http://schemas.openxmlformats.org/markup-compatibility/2006" xmlns:p14="http://schemas.microsoft.com/office/powerpoint/2010/main">
-    <mc:Choice Requires="p14">
-      <p:transition p14:dur="0"/>
-    </mc:Choice>
-    <mc:Fallback xmlns="">
-      <p:transition/>
-    </mc:Fallback>
-  </mc:AlternateContent>
-</p:sld>
-</file>
-
-<file path=ppt/slides/slide7.xml><?xml version="1.0" encoding="utf-8"?>
-<p:sld xmlns:a="http://schemas.openxmlformats.org/drawingml/2006/main" xmlns:r="http://schemas.openxmlformats.org/officeDocument/2006/relationships" xmlns:p="http://schemas.openxmlformats.org/presentationml/2006/main">
-  <p:cSld>
-    <p:spTree>
-      <p:nvGrpSpPr>
-        <p:cNvPr id="1" name=""/>
-        <p:cNvGrpSpPr/>
-        <p:nvPr/>
-      </p:nvGrpSpPr>
-      <p:grpSpPr>
-        <a:xfrm>
-          <a:off x="0" y="0"/>
-          <a:ext cx="0" cy="0"/>
-          <a:chOff x="0" y="0"/>
-          <a:chExt cx="0" cy="0"/>
-        </a:xfrm>
-      </p:grpSpPr>
-      <p:sp>
-        <p:nvSpPr>
-          <p:cNvPr id="2" name="Title 1"/>
-          <p:cNvSpPr>
-            <a:spLocks noGrp="1"/>
-          </p:cNvSpPr>
-          <p:nvPr>
-            <p:ph type="title"/>
-          </p:nvPr>
-        </p:nvSpPr>
-        <p:spPr>
-          <a:xfrm>
-            <a:off x="639792" y="0"/>
-            <a:ext cx="9601200" cy="1142385"/>
-          </a:xfrm>
-        </p:spPr>
-        <p:txBody>
-          <a:bodyPr/>
-          <a:lstStyle/>
-          <a:p>
-            <a:r>
-              <a:rPr lang="en-US" dirty="0"/>
-              <a:t>t-SNE Algorithm: Broad Strokes</a:t>
-            </a:r>
-          </a:p>
-        </p:txBody>
-      </p:sp>
-      <mc:AlternateContent xmlns:mc="http://schemas.openxmlformats.org/markup-compatibility/2006" xmlns:a14="http://schemas.microsoft.com/office/drawing/2010/main">
-        <mc:Choice Requires="a14">
-          <p:sp>
-            <p:nvSpPr>
-              <p:cNvPr id="3" name="Content Placeholder 2"/>
-              <p:cNvSpPr>
-                <a:spLocks noGrp="1"/>
-              </p:cNvSpPr>
-              <p:nvPr>
-                <p:ph idx="1"/>
-              </p:nvPr>
-            </p:nvSpPr>
-            <p:spPr>
-              <a:xfrm>
-                <a:off x="639791" y="1457864"/>
-                <a:ext cx="11178397" cy="3949708"/>
-              </a:xfrm>
-            </p:spPr>
-            <p:txBody>
-              <a:bodyPr>
-                <a:normAutofit/>
-              </a:bodyPr>
-              <a:lstStyle/>
-              <a:p>
-                <a:r>
-                  <a:rPr lang="en-US" dirty="0"/>
-                  <a:t>Since the values of </a:t>
-                </a:r>
-                <a14:m>
-                  <m:oMath xmlns:m="http://schemas.openxmlformats.org/officeDocument/2006/math">
-                    <m:r>
-                      <a:rPr lang="en-US" i="1">
-                        <a:latin typeface="Cambria Math" panose="02040503050406030204" pitchFamily="18" charset="0"/>
-                      </a:rPr>
-                      <m:t>𝑞</m:t>
-                    </m:r>
-                  </m:oMath>
-                </a14:m>
-                <a:r>
-                  <a:rPr lang="en-US" dirty="0"/>
-                  <a:t> depend on the points selected, this becomes an optimization problem:</a:t>
-                </a:r>
-                <a:br>
-                  <a:rPr lang="en-US" dirty="0"/>
-                </a:br>
-                <a:endParaRPr lang="en-US" dirty="0"/>
-              </a:p>
-              <a:p>
-                <a:pPr marL="0" indent="0" algn="ctr">
-                  <a:buNone/>
-                </a:pPr>
-                <a14:m>
-                  <m:oMathPara xmlns:m="http://schemas.openxmlformats.org/officeDocument/2006/math">
-                    <m:oMathParaPr>
-                      <m:jc m:val="centerGroup"/>
-                    </m:oMathParaPr>
-                    <m:oMath xmlns:m="http://schemas.openxmlformats.org/officeDocument/2006/math">
-                      <m:sPre>
-                        <m:sPrePr>
-                          <m:ctrlPr>
-                            <a:rPr lang="en-US" b="0" i="1" smtClean="0">
-                              <a:latin typeface="Cambria Math" panose="02040503050406030204" pitchFamily="18" charset="0"/>
-                            </a:rPr>
-                          </m:ctrlPr>
-                        </m:sPrePr>
-                        <m:sub>
-                          <m:sSub>
-                            <m:sSubPr>
-                              <m:ctrlPr>
-                                <a:rPr lang="en-US" b="0" i="1" smtClean="0">
-                                  <a:latin typeface="Cambria Math" panose="02040503050406030204" pitchFamily="18" charset="0"/>
-                                </a:rPr>
-                              </m:ctrlPr>
-                            </m:sSubPr>
-                            <m:e>
-                              <m:r>
-                                <a:rPr lang="en-US" b="0" i="1" smtClean="0">
-                                  <a:latin typeface="Cambria Math" panose="02040503050406030204" pitchFamily="18" charset="0"/>
-                                </a:rPr>
-                                <m:t>𝑦</m:t>
-                              </m:r>
-                            </m:e>
-                            <m:sub>
-                              <m:r>
-                                <a:rPr lang="en-US" b="0" i="1" smtClean="0">
-                                  <a:latin typeface="Cambria Math" panose="02040503050406030204" pitchFamily="18" charset="0"/>
-                                </a:rPr>
-                                <m:t>𝑖</m:t>
-                              </m:r>
-                            </m:sub>
-                          </m:sSub>
-                          <m:r>
-                            <a:rPr lang="en-US" b="0" i="1" smtClean="0">
-                              <a:latin typeface="Cambria Math" panose="02040503050406030204" pitchFamily="18" charset="0"/>
-                            </a:rPr>
-                            <m:t>, </m:t>
-                          </m:r>
-                          <m:sSub>
-                            <m:sSubPr>
-                              <m:ctrlPr>
-                                <a:rPr lang="en-US" b="0" i="1" smtClean="0">
-                                  <a:latin typeface="Cambria Math" panose="02040503050406030204" pitchFamily="18" charset="0"/>
-                                </a:rPr>
-                              </m:ctrlPr>
-                            </m:sSubPr>
-                            <m:e>
-                              <m:r>
-                                <a:rPr lang="en-US" b="0" i="1" smtClean="0">
-                                  <a:latin typeface="Cambria Math" panose="02040503050406030204" pitchFamily="18" charset="0"/>
-                                </a:rPr>
-                                <m:t>𝑦</m:t>
-                              </m:r>
-                            </m:e>
-                            <m:sub>
-                              <m:r>
-                                <a:rPr lang="en-US" b="0" i="1" smtClean="0">
-                                  <a:latin typeface="Cambria Math" panose="02040503050406030204" pitchFamily="18" charset="0"/>
-                                </a:rPr>
-                                <m:t>𝑗</m:t>
-                              </m:r>
-                            </m:sub>
-                          </m:sSub>
-                          <m:r>
-                            <a:rPr lang="en-US" b="0" i="1" smtClean="0">
-                              <a:latin typeface="Cambria Math" panose="02040503050406030204" pitchFamily="18" charset="0"/>
-                            </a:rPr>
-                            <m:t>     </m:t>
-                          </m:r>
-                        </m:sub>
-                        <m:sup>
-                          <m:r>
-                            <m:rPr>
-                              <m:sty m:val="p"/>
-                            </m:rPr>
-                            <a:rPr lang="en-US" b="0" i="0" smtClean="0">
-                              <a:latin typeface="Cambria Math" panose="02040503050406030204" pitchFamily="18" charset="0"/>
-                            </a:rPr>
-                            <m:t>minimize</m:t>
-                          </m:r>
-                        </m:sup>
-                        <m:e>
-                          <m:r>
-                            <a:rPr lang="en-US" b="0" i="0" smtClean="0">
-                              <a:latin typeface="Cambria Math" panose="02040503050406030204" pitchFamily="18" charset="0"/>
-                            </a:rPr>
-                            <m:t>  </m:t>
-                          </m:r>
-                          <m:r>
-                            <m:rPr>
-                              <m:sty m:val="p"/>
-                            </m:rPr>
-                            <a:rPr lang="en-US">
-                              <a:latin typeface="Cambria Math" panose="02040503050406030204" pitchFamily="18" charset="0"/>
-                            </a:rPr>
-                            <m:t>KL</m:t>
-                          </m:r>
-                          <m:r>
-                            <a:rPr lang="en-US">
-                              <a:latin typeface="Cambria Math" panose="02040503050406030204" pitchFamily="18" charset="0"/>
-                            </a:rPr>
-                            <m:t>(</m:t>
-                          </m:r>
-                          <m:d>
-                            <m:dPr>
-                              <m:begChr m:val="|"/>
-                              <m:endChr m:val="|"/>
-                              <m:ctrlPr>
-                                <a:rPr lang="en-US" i="1">
-                                  <a:latin typeface="Cambria Math" panose="02040503050406030204" pitchFamily="18" charset="0"/>
-                                </a:rPr>
-                              </m:ctrlPr>
-                            </m:dPr>
-                            <m:e>
-                              <m:r>
-                                <a:rPr lang="en-US" i="1">
-                                  <a:latin typeface="Cambria Math" panose="02040503050406030204" pitchFamily="18" charset="0"/>
-                                </a:rPr>
-                                <m:t>𝑝</m:t>
-                              </m:r>
-                              <m:r>
-                                <a:rPr lang="en-US" i="1">
-                                  <a:latin typeface="Cambria Math" panose="02040503050406030204" pitchFamily="18" charset="0"/>
-                                </a:rPr>
-                                <m:t>−</m:t>
-                              </m:r>
-                              <m:r>
-                                <a:rPr lang="en-US" i="1">
-                                  <a:latin typeface="Cambria Math" panose="02040503050406030204" pitchFamily="18" charset="0"/>
-                                </a:rPr>
-                                <m:t>𝑞</m:t>
-                              </m:r>
-                            </m:e>
-                          </m:d>
-                          <m:r>
-                            <a:rPr lang="en-US" i="1">
-                              <a:latin typeface="Cambria Math" panose="02040503050406030204" pitchFamily="18" charset="0"/>
-                            </a:rPr>
-                            <m:t>)</m:t>
-                          </m:r>
-                        </m:e>
-                      </m:sPre>
-                    </m:oMath>
-                    <m:oMath xmlns:m="http://schemas.openxmlformats.org/officeDocument/2006/math">
-                      <m:r>
-                        <m:rPr>
-                          <m:sty m:val="p"/>
-                        </m:rPr>
-                        <a:rPr lang="en-US" b="0" i="0" smtClean="0">
-                          <a:latin typeface="Cambria Math" panose="02040503050406030204" pitchFamily="18" charset="0"/>
-                        </a:rPr>
-                        <m:t>subject</m:t>
-                      </m:r>
-                      <m:r>
-                        <a:rPr lang="en-US" b="0" i="0" smtClean="0">
-                          <a:latin typeface="Cambria Math" panose="02040503050406030204" pitchFamily="18" charset="0"/>
-                        </a:rPr>
-                        <m:t> </m:t>
-                      </m:r>
-                      <m:r>
-                        <m:rPr>
-                          <m:sty m:val="p"/>
-                        </m:rPr>
-                        <a:rPr lang="en-US" b="0" i="0" smtClean="0">
-                          <a:latin typeface="Cambria Math" panose="02040503050406030204" pitchFamily="18" charset="0"/>
-                        </a:rPr>
-                        <m:t>to</m:t>
-                      </m:r>
-                      <m:r>
-                        <a:rPr lang="en-US" b="0" i="0" smtClean="0">
-                          <a:latin typeface="Cambria Math" panose="02040503050406030204" pitchFamily="18" charset="0"/>
-                        </a:rPr>
-                        <m:t>  </m:t>
-                      </m:r>
-                      <m:sSub>
-                        <m:sSubPr>
-                          <m:ctrlPr>
-                            <a:rPr lang="en-US" b="0" i="1" smtClean="0">
-                              <a:latin typeface="Cambria Math" panose="02040503050406030204" pitchFamily="18" charset="0"/>
-                            </a:rPr>
-                          </m:ctrlPr>
-                        </m:sSubPr>
-                        <m:e>
-                          <m:r>
-                            <a:rPr lang="en-US" b="0" i="1" smtClean="0">
-                              <a:latin typeface="Cambria Math" panose="02040503050406030204" pitchFamily="18" charset="0"/>
-                            </a:rPr>
-                            <m:t>𝑞</m:t>
-                          </m:r>
-                        </m:e>
-                        <m:sub>
-                          <m:r>
-                            <a:rPr lang="en-US" b="0" i="1" smtClean="0">
-                              <a:latin typeface="Cambria Math" panose="02040503050406030204" pitchFamily="18" charset="0"/>
-                            </a:rPr>
-                            <m:t>𝑖𝑗</m:t>
-                          </m:r>
-                        </m:sub>
-                      </m:sSub>
-                      <m:r>
-                        <a:rPr lang="en-US" b="0" i="1" smtClean="0">
-                          <a:latin typeface="Cambria Math" panose="02040503050406030204" pitchFamily="18" charset="0"/>
-                        </a:rPr>
-                        <m:t>=</m:t>
-                      </m:r>
-                      <m:r>
-                        <a:rPr lang="en-US" b="0" i="1" smtClean="0">
-                          <a:latin typeface="Cambria Math" panose="02040503050406030204" pitchFamily="18" charset="0"/>
-                        </a:rPr>
-                        <m:t>𝐹</m:t>
-                      </m:r>
-                      <m:d>
-                        <m:dPr>
-                          <m:ctrlPr>
-                            <a:rPr lang="en-US" b="0" i="1" smtClean="0">
-                              <a:latin typeface="Cambria Math" panose="02040503050406030204" pitchFamily="18" charset="0"/>
-                            </a:rPr>
-                          </m:ctrlPr>
-                        </m:dPr>
-                        <m:e>
-                          <m:d>
-                            <m:dPr>
-                              <m:begChr m:val="|"/>
-                              <m:endChr m:val="|"/>
-                              <m:ctrlPr>
-                                <a:rPr lang="en-US" b="0" i="1" smtClean="0">
-                                  <a:latin typeface="Cambria Math" panose="02040503050406030204" pitchFamily="18" charset="0"/>
-                                </a:rPr>
-                              </m:ctrlPr>
-                            </m:dPr>
-                            <m:e>
-                              <m:sSub>
-                                <m:sSubPr>
-                                  <m:ctrlPr>
-                                    <a:rPr lang="en-US" b="0" i="1" smtClean="0">
-                                      <a:latin typeface="Cambria Math" panose="02040503050406030204" pitchFamily="18" charset="0"/>
-                                    </a:rPr>
-                                  </m:ctrlPr>
-                                </m:sSubPr>
-                                <m:e>
-                                  <m:r>
-                                    <a:rPr lang="en-US" b="0" i="1" smtClean="0">
-                                      <a:latin typeface="Cambria Math" panose="02040503050406030204" pitchFamily="18" charset="0"/>
-                                    </a:rPr>
-                                    <m:t>𝑦</m:t>
-                                  </m:r>
-                                </m:e>
-                                <m:sub>
-                                  <m:r>
-                                    <a:rPr lang="en-US" b="0" i="1" smtClean="0">
-                                      <a:latin typeface="Cambria Math" panose="02040503050406030204" pitchFamily="18" charset="0"/>
-                                    </a:rPr>
-                                    <m:t>𝑖</m:t>
-                                  </m:r>
-                                </m:sub>
-                              </m:sSub>
-                              <m:r>
-                                <a:rPr lang="en-US" b="0" i="1" smtClean="0">
-                                  <a:latin typeface="Cambria Math" panose="02040503050406030204" pitchFamily="18" charset="0"/>
-                                </a:rPr>
-                                <m:t>−</m:t>
-                              </m:r>
-                              <m:sSub>
-                                <m:sSubPr>
-                                  <m:ctrlPr>
-                                    <a:rPr lang="en-US" b="0" i="1" smtClean="0">
-                                      <a:latin typeface="Cambria Math" panose="02040503050406030204" pitchFamily="18" charset="0"/>
-                                    </a:rPr>
-                                  </m:ctrlPr>
-                                </m:sSubPr>
-                                <m:e>
-                                  <m:r>
-                                    <a:rPr lang="en-US" b="0" i="1" smtClean="0">
-                                      <a:latin typeface="Cambria Math" panose="02040503050406030204" pitchFamily="18" charset="0"/>
-                                    </a:rPr>
-                                    <m:t>𝑦</m:t>
-                                  </m:r>
-                                </m:e>
-                                <m:sub>
-                                  <m:r>
-                                    <a:rPr lang="en-US" b="0" i="1" smtClean="0">
-                                      <a:latin typeface="Cambria Math" panose="02040503050406030204" pitchFamily="18" charset="0"/>
-                                    </a:rPr>
-                                    <m:t>𝑗</m:t>
-                                  </m:r>
-                                </m:sub>
-                              </m:sSub>
-                            </m:e>
-                          </m:d>
-                        </m:e>
-                      </m:d>
-                    </m:oMath>
-                  </m:oMathPara>
-                </a14:m>
-                <a:endParaRPr lang="en-US" b="0" dirty="0"/>
-              </a:p>
-              <a:p>
-                <a:endParaRPr lang="en-US" dirty="0"/>
-              </a:p>
-              <a:p>
-                <a:r>
-                  <a:rPr lang="en-US" dirty="0"/>
-                  <a:t>Physical analogy: </a:t>
-                </a:r>
-              </a:p>
-              <a:p>
-                <a:pPr lvl="1"/>
-                <a:r>
-                  <a:rPr lang="en-US" b="0" dirty="0"/>
-                  <a:t>Imagine a spring connecting each pair of points in the reduced data set</a:t>
-                </a:r>
-              </a:p>
-              <a:p>
-                <a:pPr lvl="1"/>
-                <a:r>
-                  <a:rPr lang="en-US" dirty="0"/>
-                  <a:t>Stiffness of spring depends on distance between the points in the original data set and </a:t>
-                </a:r>
-                <a14:m>
-                  <m:oMath xmlns:m="http://schemas.openxmlformats.org/officeDocument/2006/math">
-                    <m:r>
-                      <a:rPr lang="en-US" b="0" i="1" smtClean="0">
-                        <a:latin typeface="Cambria Math" panose="02040503050406030204" pitchFamily="18" charset="0"/>
-                      </a:rPr>
-                      <m:t>|</m:t>
-                    </m:r>
-                    <m:sSub>
-                      <m:sSubPr>
-                        <m:ctrlPr>
-                          <a:rPr lang="en-US" b="0" i="1" smtClean="0">
-                            <a:latin typeface="Cambria Math" panose="02040503050406030204" pitchFamily="18" charset="0"/>
-                          </a:rPr>
-                        </m:ctrlPr>
-                      </m:sSubPr>
-                      <m:e>
-                        <m:r>
-                          <a:rPr lang="en-US" b="0" i="1" smtClean="0">
-                            <a:latin typeface="Cambria Math" panose="02040503050406030204" pitchFamily="18" charset="0"/>
-                          </a:rPr>
-                          <m:t>𝑝</m:t>
-                        </m:r>
-                      </m:e>
-                      <m:sub>
-                        <m:r>
-                          <a:rPr lang="en-US" b="0" i="1" smtClean="0">
-                            <a:latin typeface="Cambria Math" panose="02040503050406030204" pitchFamily="18" charset="0"/>
-                          </a:rPr>
-                          <m:t>𝑖𝑗</m:t>
-                        </m:r>
-                      </m:sub>
-                    </m:sSub>
-                    <m:r>
-                      <a:rPr lang="en-US" b="0" i="1" smtClean="0">
-                        <a:latin typeface="Cambria Math" panose="02040503050406030204" pitchFamily="18" charset="0"/>
-                      </a:rPr>
-                      <m:t>−</m:t>
-                    </m:r>
-                    <m:sSub>
-                      <m:sSubPr>
-                        <m:ctrlPr>
-                          <a:rPr lang="en-US" b="0" i="1" smtClean="0">
-                            <a:latin typeface="Cambria Math" panose="02040503050406030204" pitchFamily="18" charset="0"/>
-                          </a:rPr>
-                        </m:ctrlPr>
-                      </m:sSubPr>
-                      <m:e>
-                        <m:r>
-                          <a:rPr lang="en-US" b="0" i="1" smtClean="0">
-                            <a:latin typeface="Cambria Math" panose="02040503050406030204" pitchFamily="18" charset="0"/>
-                          </a:rPr>
-                          <m:t>𝑞</m:t>
-                        </m:r>
-                      </m:e>
-                      <m:sub>
-                        <m:r>
-                          <a:rPr lang="en-US" b="0" i="1" smtClean="0">
-                            <a:latin typeface="Cambria Math" panose="02040503050406030204" pitchFamily="18" charset="0"/>
-                          </a:rPr>
-                          <m:t>𝑖𝑗</m:t>
-                        </m:r>
-                      </m:sub>
-                    </m:sSub>
-                    <m:r>
-                      <a:rPr lang="en-US" b="0" i="1" smtClean="0">
-                        <a:latin typeface="Cambria Math" panose="02040503050406030204" pitchFamily="18" charset="0"/>
-                      </a:rPr>
-                      <m:t>|</m:t>
-                    </m:r>
-                  </m:oMath>
-                </a14:m>
-                <a:endParaRPr lang="en-US" b="1" dirty="0"/>
-              </a:p>
-              <a:p>
-                <a:pPr lvl="1"/>
-                <a:r>
-                  <a:rPr lang="en-US" dirty="0"/>
-                  <a:t>Ensures that similar points in original data set are close in 2D, and ensures that the opposite holds too</a:t>
-                </a:r>
-              </a:p>
-            </p:txBody>
-          </p:sp>
-        </mc:Choice>
-        <mc:Fallback xmlns="">
-          <p:sp>
-            <p:nvSpPr>
-              <p:cNvPr id="3" name="Content Placeholder 2"/>
-              <p:cNvSpPr>
-                <a:spLocks noGrp="1" noRot="1" noChangeAspect="1" noMove="1" noResize="1" noEditPoints="1" noAdjustHandles="1" noChangeArrowheads="1" noChangeShapeType="1" noTextEdit="1"/>
-              </p:cNvSpPr>
-              <p:nvPr>
-                <p:ph idx="1"/>
-              </p:nvPr>
-            </p:nvSpPr>
-            <p:spPr>
-              <a:xfrm>
-                <a:off x="639791" y="1457864"/>
-                <a:ext cx="11178397" cy="3949708"/>
-              </a:xfrm>
-              <a:blipFill>
-                <a:blip r:embed="rId3"/>
-                <a:stretch>
-                  <a:fillRect l="-491" t="-1389"/>
-                </a:stretch>
-              </a:blipFill>
-            </p:spPr>
-            <p:txBody>
-              <a:bodyPr/>
-              <a:lstStyle/>
-              <a:p>
-                <a:r>
-                  <a:rPr lang="en-US">
-                    <a:noFill/>
-                  </a:rPr>
-                  <a:t> </a:t>
-                </a:r>
-              </a:p>
-            </p:txBody>
-          </p:sp>
-        </mc:Fallback>
-      </mc:AlternateContent>
       <p:sp>
         <p:nvSpPr>
           <p:cNvPr id="4" name="TextBox 3"/>
@@ -17538,12 +15964,18 @@
       </p:sp>
       <p:sp>
         <p:nvSpPr>
-          <p:cNvPr id="5" name="Slide Number Placeholder 4"/>
+          <p:cNvPr id="7" name="Espace réservé du contenu 6">
+            <a:extLst>
+              <a:ext uri="{FF2B5EF4-FFF2-40B4-BE49-F238E27FC236}">
+                <a16:creationId xmlns:a16="http://schemas.microsoft.com/office/drawing/2014/main" id="{50BBD1D5-9A41-40C0-AA69-A6BE5350C14D}"/>
+              </a:ext>
+            </a:extLst>
+          </p:cNvPr>
           <p:cNvSpPr>
             <a:spLocks noGrp="1"/>
           </p:cNvSpPr>
           <p:nvPr>
-            <p:ph type="sldNum" sz="quarter" idx="12"/>
+            <p:ph idx="1"/>
           </p:nvPr>
         </p:nvSpPr>
         <p:spPr/>
@@ -17551,11 +15983,7 @@
           <a:bodyPr/>
           <a:lstStyle/>
           <a:p>
-            <a:fld id="{E31375A4-56A4-47D6-9801-1991572033F7}" type="slidenum">
-              <a:rPr lang="en-US" smtClean="0"/>
-              <a:t>7</a:t>
-            </a:fld>
-            <a:endParaRPr lang="en-US"/>
+            <a:endParaRPr lang="fr-CA"/>
           </a:p>
         </p:txBody>
       </p:sp>
@@ -17580,399 +16008,17 @@
 </p:sld>
 </file>
 
-<file path=ppt/slides/slide8.xml><?xml version="1.0" encoding="utf-8"?>
+<file path=ppt/slides/slide5.xml><?xml version="1.0" encoding="utf-8"?>
 <p:sld xmlns:a="http://schemas.openxmlformats.org/drawingml/2006/main" xmlns:r="http://schemas.openxmlformats.org/officeDocument/2006/relationships" xmlns:p="http://schemas.openxmlformats.org/presentationml/2006/main">
   <p:cSld>
-    <p:spTree>
-      <p:nvGrpSpPr>
-        <p:cNvPr id="1" name=""/>
-        <p:cNvGrpSpPr/>
-        <p:nvPr/>
-      </p:nvGrpSpPr>
-      <p:grpSpPr>
-        <a:xfrm>
-          <a:off x="0" y="0"/>
-          <a:ext cx="0" cy="0"/>
-          <a:chOff x="0" y="0"/>
-          <a:chExt cx="0" cy="0"/>
-        </a:xfrm>
-      </p:grpSpPr>
-      <p:sp>
-        <p:nvSpPr>
-          <p:cNvPr id="2" name="Title 1"/>
-          <p:cNvSpPr>
-            <a:spLocks noGrp="1"/>
-          </p:cNvSpPr>
-          <p:nvPr>
-            <p:ph type="title"/>
-          </p:nvPr>
-        </p:nvSpPr>
-        <p:spPr>
-          <a:xfrm>
-            <a:off x="625365" y="377729"/>
-            <a:ext cx="10126718" cy="639147"/>
-          </a:xfrm>
-        </p:spPr>
-        <p:txBody>
-          <a:bodyPr>
-            <a:normAutofit/>
-          </a:bodyPr>
-          <a:lstStyle/>
-          <a:p>
-            <a:r>
-              <a:rPr lang="en-US" dirty="0"/>
-              <a:t>Duration and Number of Transitions</a:t>
-            </a:r>
-          </a:p>
-        </p:txBody>
-      </p:sp>
-      <p:sp>
-        <p:nvSpPr>
-          <p:cNvPr id="3" name="Content Placeholder 2"/>
-          <p:cNvSpPr>
-            <a:spLocks noGrp="1"/>
-          </p:cNvSpPr>
-          <p:nvPr>
-            <p:ph sz="half" idx="1"/>
-          </p:nvPr>
-        </p:nvSpPr>
-        <p:spPr>
-          <a:xfrm>
-            <a:off x="500593" y="1173193"/>
-            <a:ext cx="4930047" cy="4604979"/>
-          </a:xfrm>
-        </p:spPr>
-        <p:txBody>
-          <a:bodyPr/>
-          <a:lstStyle/>
-          <a:p>
-            <a:r>
-              <a:rPr lang="en-US" dirty="0"/>
-              <a:t>Layer 0: </a:t>
-            </a:r>
-          </a:p>
-          <a:p>
-            <a:pPr lvl="1"/>
-            <a:r>
-              <a:rPr lang="en-US" dirty="0"/>
-              <a:t>820 subjects</a:t>
-            </a:r>
-          </a:p>
-          <a:p>
-            <a:r>
-              <a:rPr lang="en-US" dirty="0"/>
-              <a:t>Layer 1:</a:t>
-            </a:r>
-          </a:p>
-          <a:p>
-            <a:pPr lvl="1"/>
-            <a:r>
-              <a:rPr lang="en-US" dirty="0"/>
-              <a:t>Varying the threshold value from 5 to 50 and in intervals of 5</a:t>
-            </a:r>
-          </a:p>
-          <a:p>
-            <a:r>
-              <a:rPr lang="en-US" dirty="0"/>
-              <a:t>Layer 2: </a:t>
-            </a:r>
-          </a:p>
-          <a:p>
-            <a:pPr lvl="1"/>
-            <a:r>
-              <a:rPr lang="en-US" dirty="0"/>
-              <a:t>Maximum duration</a:t>
-            </a:r>
-          </a:p>
-          <a:p>
-            <a:pPr lvl="1"/>
-            <a:r>
-              <a:rPr lang="en-US" dirty="0"/>
-              <a:t>Average duration</a:t>
-            </a:r>
-          </a:p>
-          <a:p>
-            <a:pPr lvl="1"/>
-            <a:r>
-              <a:rPr lang="en-US" dirty="0"/>
-              <a:t>Number of </a:t>
-            </a:r>
-            <a:r>
-              <a:rPr lang="en-US" u="sng" dirty="0"/>
-              <a:t>transitions</a:t>
-            </a:r>
-          </a:p>
-          <a:p>
-            <a:r>
-              <a:rPr lang="en-US" dirty="0"/>
-              <a:t>Layer 3:</a:t>
-            </a:r>
-          </a:p>
-          <a:p>
-            <a:pPr lvl="1"/>
-            <a:r>
-              <a:rPr lang="en-US" dirty="0"/>
-              <a:t>Hippocampal volumes</a:t>
-            </a:r>
-          </a:p>
-        </p:txBody>
-      </p:sp>
-      <p:sp>
-        <p:nvSpPr>
-          <p:cNvPr id="4" name="Slide Number Placeholder 3"/>
-          <p:cNvSpPr>
-            <a:spLocks noGrp="1"/>
-          </p:cNvSpPr>
-          <p:nvPr>
-            <p:ph type="sldNum" sz="quarter" idx="12"/>
-          </p:nvPr>
-        </p:nvSpPr>
-        <p:spPr/>
-        <p:txBody>
-          <a:bodyPr/>
-          <a:lstStyle/>
-          <a:p>
-            <a:fld id="{E31375A4-56A4-47D6-9801-1991572033F7}" type="slidenum">
-              <a:rPr lang="en-US" smtClean="0"/>
-              <a:t>8</a:t>
-            </a:fld>
-            <a:endParaRPr lang="en-US"/>
-          </a:p>
-        </p:txBody>
-      </p:sp>
-      <p:pic>
-        <p:nvPicPr>
-          <p:cNvPr id="5" name="Picture 4"/>
-          <p:cNvPicPr>
-            <a:picLocks noChangeAspect="1"/>
-          </p:cNvPicPr>
-          <p:nvPr/>
-        </p:nvPicPr>
-        <p:blipFill rotWithShape="1">
-          <a:blip r:embed="rId3"/>
-          <a:srcRect b="63229"/>
-          <a:stretch/>
-        </p:blipFill>
-        <p:spPr>
-          <a:xfrm>
-            <a:off x="5719574" y="1173193"/>
-            <a:ext cx="5864619" cy="2518914"/>
-          </a:xfrm>
-          <a:prstGeom prst="rect">
-            <a:avLst/>
-          </a:prstGeom>
-        </p:spPr>
-      </p:pic>
-      <p:sp>
-        <p:nvSpPr>
-          <p:cNvPr id="6" name="Oval 5"/>
-          <p:cNvSpPr/>
-          <p:nvPr/>
-        </p:nvSpPr>
-        <p:spPr>
-          <a:xfrm>
-            <a:off x="9621983" y="2470611"/>
-            <a:ext cx="1541031" cy="535172"/>
-          </a:xfrm>
-          <a:prstGeom prst="ellipse">
-            <a:avLst/>
-          </a:prstGeom>
-          <a:noFill/>
-          <a:ln>
-            <a:solidFill>
-              <a:srgbClr val="FF0000"/>
-            </a:solidFill>
-          </a:ln>
-        </p:spPr>
-        <p:style>
-          <a:lnRef idx="2">
-            <a:schemeClr val="accent1">
-              <a:shade val="50000"/>
-            </a:schemeClr>
-          </a:lnRef>
-          <a:fillRef idx="1">
-            <a:schemeClr val="accent1"/>
-          </a:fillRef>
-          <a:effectRef idx="0">
-            <a:schemeClr val="accent1"/>
-          </a:effectRef>
-          <a:fontRef idx="minor">
-            <a:schemeClr val="lt1"/>
-          </a:fontRef>
-        </p:style>
-        <p:txBody>
-          <a:bodyPr rtlCol="0" anchor="ctr"/>
-          <a:lstStyle/>
-          <a:p>
-            <a:pPr algn="ctr"/>
-            <a:endParaRPr lang="en-US"/>
-          </a:p>
-        </p:txBody>
-      </p:sp>
-      <p:pic>
-        <p:nvPicPr>
-          <p:cNvPr id="7" name="Picture 6"/>
-          <p:cNvPicPr>
-            <a:picLocks noChangeAspect="1"/>
-          </p:cNvPicPr>
-          <p:nvPr/>
-        </p:nvPicPr>
-        <p:blipFill>
-          <a:blip r:embed="rId4"/>
-          <a:stretch>
-            <a:fillRect/>
-          </a:stretch>
-        </p:blipFill>
-        <p:spPr>
-          <a:xfrm>
-            <a:off x="6232533" y="3848424"/>
-            <a:ext cx="4838700" cy="971550"/>
-          </a:xfrm>
-          <a:prstGeom prst="rect">
-            <a:avLst/>
-          </a:prstGeom>
-        </p:spPr>
-      </p:pic>
-      <p:pic>
-        <p:nvPicPr>
-          <p:cNvPr id="8" name="Picture 7"/>
-          <p:cNvPicPr>
-            <a:picLocks noChangeAspect="1"/>
-          </p:cNvPicPr>
-          <p:nvPr/>
-        </p:nvPicPr>
-        <p:blipFill>
-          <a:blip r:embed="rId5"/>
-          <a:stretch>
-            <a:fillRect/>
-          </a:stretch>
-        </p:blipFill>
-        <p:spPr>
-          <a:xfrm>
-            <a:off x="6299208" y="5102389"/>
-            <a:ext cx="4772025" cy="904875"/>
-          </a:xfrm>
-          <a:prstGeom prst="rect">
-            <a:avLst/>
-          </a:prstGeom>
-        </p:spPr>
-      </p:pic>
-      <p:sp>
-        <p:nvSpPr>
-          <p:cNvPr id="9" name="Rectangle 8"/>
-          <p:cNvSpPr/>
-          <p:nvPr/>
-        </p:nvSpPr>
-        <p:spPr>
-          <a:xfrm>
-            <a:off x="9492118" y="3974552"/>
-            <a:ext cx="1173193" cy="422695"/>
-          </a:xfrm>
-          <a:prstGeom prst="rect">
-            <a:avLst/>
-          </a:prstGeom>
-          <a:noFill/>
-          <a:ln w="15875">
-            <a:solidFill>
-              <a:srgbClr val="FF0000"/>
-            </a:solidFill>
-          </a:ln>
-        </p:spPr>
-        <p:style>
-          <a:lnRef idx="2">
-            <a:schemeClr val="accent1">
-              <a:shade val="50000"/>
-            </a:schemeClr>
-          </a:lnRef>
-          <a:fillRef idx="1">
-            <a:schemeClr val="accent1"/>
-          </a:fillRef>
-          <a:effectRef idx="0">
-            <a:schemeClr val="accent1"/>
-          </a:effectRef>
-          <a:fontRef idx="minor">
-            <a:schemeClr val="lt1"/>
-          </a:fontRef>
-        </p:style>
-        <p:txBody>
-          <a:bodyPr rtlCol="0" anchor="ctr"/>
-          <a:lstStyle/>
-          <a:p>
-            <a:pPr algn="ctr"/>
-            <a:endParaRPr lang="en-US"/>
-          </a:p>
-        </p:txBody>
-      </p:sp>
-      <p:sp>
-        <p:nvSpPr>
-          <p:cNvPr id="10" name="Rectangle 9"/>
-          <p:cNvSpPr/>
-          <p:nvPr/>
-        </p:nvSpPr>
-        <p:spPr>
-          <a:xfrm>
-            <a:off x="9492118" y="5292201"/>
-            <a:ext cx="1173193" cy="422695"/>
-          </a:xfrm>
-          <a:prstGeom prst="rect">
-            <a:avLst/>
-          </a:prstGeom>
-          <a:noFill/>
-          <a:ln w="15875">
-            <a:solidFill>
-              <a:srgbClr val="FF0000"/>
-            </a:solidFill>
-          </a:ln>
-        </p:spPr>
-        <p:style>
-          <a:lnRef idx="2">
-            <a:schemeClr val="accent1">
-              <a:shade val="50000"/>
-            </a:schemeClr>
-          </a:lnRef>
-          <a:fillRef idx="1">
-            <a:schemeClr val="accent1"/>
-          </a:fillRef>
-          <a:effectRef idx="0">
-            <a:schemeClr val="accent1"/>
-          </a:effectRef>
-          <a:fontRef idx="minor">
-            <a:schemeClr val="lt1"/>
-          </a:fontRef>
-        </p:style>
-        <p:txBody>
-          <a:bodyPr rtlCol="0" anchor="ctr"/>
-          <a:lstStyle/>
-          <a:p>
-            <a:pPr algn="ctr"/>
-            <a:endParaRPr lang="en-US"/>
-          </a:p>
-        </p:txBody>
-      </p:sp>
-    </p:spTree>
-    <p:extLst>
-      <p:ext uri="{BB962C8B-B14F-4D97-AF65-F5344CB8AC3E}">
-        <p14:creationId xmlns:p14="http://schemas.microsoft.com/office/powerpoint/2010/main" val="2475092730"/>
-      </p:ext>
-    </p:extLst>
-  </p:cSld>
-  <p:clrMapOvr>
-    <a:masterClrMapping/>
-  </p:clrMapOvr>
-  <mc:AlternateContent xmlns:mc="http://schemas.openxmlformats.org/markup-compatibility/2006" xmlns:p14="http://schemas.microsoft.com/office/powerpoint/2010/main">
-    <mc:Choice Requires="p14">
-      <p:transition p14:dur="0"/>
-    </mc:Choice>
-    <mc:Fallback xmlns="">
-      <p:transition/>
-    </mc:Fallback>
-  </mc:AlternateContent>
-</p:sld>
-</file>
-
-<file path=ppt/slides/slide9.xml><?xml version="1.0" encoding="utf-8"?>
-<p:sld xmlns:a="http://schemas.openxmlformats.org/drawingml/2006/main" xmlns:r="http://schemas.openxmlformats.org/officeDocument/2006/relationships" xmlns:p="http://schemas.openxmlformats.org/presentationml/2006/main">
-  <p:cSld>
+    <p:bg>
+      <p:bgPr>
+        <a:solidFill>
+          <a:srgbClr val="48B53F"/>
+        </a:solidFill>
+        <a:effectLst/>
+      </p:bgPr>
+    </p:bg>
     <p:spTree>
       <p:nvGrpSpPr>
         <p:cNvPr id="1" name=""/>
@@ -18004,7 +16050,7 @@
           <a:p>
             <a:r>
               <a:rPr lang="en-US" dirty="0"/>
-              <a:t>Further Areas of Work</a:t>
+              <a:t>Potential improvements</a:t>
             </a:r>
           </a:p>
         </p:txBody>
@@ -18026,24 +16072,53 @@
           </a:xfrm>
         </p:spPr>
         <p:txBody>
-          <a:bodyPr/>
+          <a:bodyPr>
+            <a:normAutofit/>
+          </a:bodyPr>
           <a:lstStyle/>
           <a:p>
             <a:r>
-              <a:rPr lang="en-US" dirty="0"/>
-              <a:t>Better image recognition and category sorting</a:t>
+              <a:rPr lang="en-US" sz="2800" dirty="0"/>
+              <a:t>Customizability </a:t>
             </a:r>
           </a:p>
           <a:p>
+            <a:pPr lvl="1"/>
             <a:r>
-              <a:rPr lang="en-US" dirty="0"/>
-              <a:t>Better user interface</a:t>
+              <a:rPr lang="en-US" sz="2400" dirty="0"/>
+              <a:t>Different cities have different rules.</a:t>
             </a:r>
           </a:p>
           <a:p>
+            <a:endParaRPr lang="en-US" sz="2800" dirty="0"/>
+          </a:p>
+          <a:p>
             <a:r>
-              <a:rPr lang="en-US" dirty="0"/>
-              <a:t>Integrate with university app or city app</a:t>
+              <a:rPr lang="en-US" sz="2800" dirty="0"/>
+              <a:t>Refinement of last layer</a:t>
+            </a:r>
+          </a:p>
+          <a:p>
+            <a:pPr lvl="1"/>
+            <a:r>
+              <a:rPr lang="en-US" sz="2400" dirty="0"/>
+              <a:t>Train on user feedback</a:t>
+            </a:r>
+          </a:p>
+          <a:p>
+            <a:pPr lvl="1"/>
+            <a:r>
+              <a:rPr lang="en-US" sz="2400" dirty="0"/>
+              <a:t>Add more labels </a:t>
+            </a:r>
+          </a:p>
+          <a:p>
+            <a:endParaRPr lang="en-US" sz="2800" dirty="0"/>
+          </a:p>
+          <a:p>
+            <a:r>
+              <a:rPr lang="en-US" sz="2800" dirty="0"/>
+              <a:t>Change pretrained network for the latest Inception version </a:t>
             </a:r>
           </a:p>
         </p:txBody>
@@ -18068,10 +16143,7 @@
           <a:bodyPr/>
           <a:lstStyle/>
           <a:p>
-            <a:r>
-              <a:rPr lang="en-US" dirty="0"/>
-              <a:t>Multi-Node Analysis</a:t>
-            </a:r>
+            <a:endParaRPr lang="en-US" dirty="0"/>
           </a:p>
         </p:txBody>
       </p:sp>
@@ -18099,7 +16171,7 @@
 <file path=ppt/theme/theme1.xml><?xml version="1.0" encoding="utf-8"?>
 <a:theme xmlns:a="http://schemas.openxmlformats.org/drawingml/2006/main" name="Diamond Grid 16x9">
   <a:themeElements>
-    <a:clrScheme name="DiamondGrid">
+    <a:clrScheme name="Personnalisé 1">
       <a:dk1>
         <a:srgbClr val="2D2E2D"/>
       </a:dk1>
@@ -18113,7 +16185,7 @@
         <a:srgbClr val="EAEAEA"/>
       </a:lt2>
       <a:accent1>
-        <a:srgbClr val="D15A3E"/>
+        <a:srgbClr val="48B53F"/>
       </a:accent1>
       <a:accent2>
         <a:srgbClr val="B2B2B2"/>

</xml_diff>